<commit_message>
Added Background, Objective, a bit of Method
</commit_message>
<xml_diff>
--- a/Poster.pptx
+++ b/Poster.pptx
@@ -107,6 +107,22 @@
 </p:presentation>
 </file>
 
+<file path=ppt/commentAuthors.xml><?xml version="1.0" encoding="utf-8"?>
+<p:cmAuthorLst xmlns:a="http://schemas.openxmlformats.org/drawingml/2006/main" xmlns:r="http://schemas.openxmlformats.org/officeDocument/2006/relationships" xmlns:p="http://schemas.openxmlformats.org/presentationml/2006/main">
+  <p:cmAuthor id="0" name="Gabrielle" initials="" lastIdx="1" clrIdx="0"/>
+</p:cmAuthorLst>
+</file>
+
+<file path=ppt/comments/comment1.xml><?xml version="1.0" encoding="utf-8"?>
+<p:cmLst xmlns:a="http://schemas.openxmlformats.org/drawingml/2006/main" xmlns:r="http://schemas.openxmlformats.org/officeDocument/2006/relationships" xmlns:p="http://schemas.openxmlformats.org/presentationml/2006/main">
+  <p:cm authorId="0" dt="2016-07-14T21:08:21.880" idx="1">
+    <p:pos x="8178" y="889"/>
+    <p:text>EBOH and Lady Davis good for you?
+And which institute funds your PhD? For the logo.</p:text>
+  </p:cm>
+</p:cmLst>
+</file>
+
 <file path=ppt/slideLayouts/slideLayout1.xml><?xml version="1.0" encoding="utf-8"?>
 <p:sldLayout xmlns:a="http://schemas.openxmlformats.org/drawingml/2006/main" xmlns:r="http://schemas.openxmlformats.org/officeDocument/2006/relationships" xmlns:p="http://schemas.openxmlformats.org/presentationml/2006/main" type="title" preserve="1">
   <p:cSld name="Title Slide">
@@ -288,7 +304,7 @@
           <a:p>
             <a:fld id="{BA3D2166-DA3A-7E42-B5FA-B8909614B8FF}" type="datetimeFigureOut">
               <a:rPr lang="en-US" smtClean="0"/>
-              <a:t>2016-07-08</a:t>
+              <a:t>2016-07-14</a:t>
             </a:fld>
             <a:endParaRPr lang="en-US"/>
           </a:p>
@@ -458,7 +474,7 @@
           <a:p>
             <a:fld id="{BA3D2166-DA3A-7E42-B5FA-B8909614B8FF}" type="datetimeFigureOut">
               <a:rPr lang="en-US" smtClean="0"/>
-              <a:t>2016-07-08</a:t>
+              <a:t>2016-07-14</a:t>
             </a:fld>
             <a:endParaRPr lang="en-US"/>
           </a:p>
@@ -638,7 +654,7 @@
           <a:p>
             <a:fld id="{BA3D2166-DA3A-7E42-B5FA-B8909614B8FF}" type="datetimeFigureOut">
               <a:rPr lang="en-US" smtClean="0"/>
-              <a:t>2016-07-08</a:t>
+              <a:t>2016-07-14</a:t>
             </a:fld>
             <a:endParaRPr lang="en-US"/>
           </a:p>
@@ -808,7 +824,7 @@
           <a:p>
             <a:fld id="{BA3D2166-DA3A-7E42-B5FA-B8909614B8FF}" type="datetimeFigureOut">
               <a:rPr lang="en-US" smtClean="0"/>
-              <a:t>2016-07-08</a:t>
+              <a:t>2016-07-14</a:t>
             </a:fld>
             <a:endParaRPr lang="en-US"/>
           </a:p>
@@ -1054,7 +1070,7 @@
           <a:p>
             <a:fld id="{BA3D2166-DA3A-7E42-B5FA-B8909614B8FF}" type="datetimeFigureOut">
               <a:rPr lang="en-US" smtClean="0"/>
-              <a:t>2016-07-08</a:t>
+              <a:t>2016-07-14</a:t>
             </a:fld>
             <a:endParaRPr lang="en-US"/>
           </a:p>
@@ -1342,7 +1358,7 @@
           <a:p>
             <a:fld id="{BA3D2166-DA3A-7E42-B5FA-B8909614B8FF}" type="datetimeFigureOut">
               <a:rPr lang="en-US" smtClean="0"/>
-              <a:t>2016-07-08</a:t>
+              <a:t>2016-07-14</a:t>
             </a:fld>
             <a:endParaRPr lang="en-US"/>
           </a:p>
@@ -1769,7 +1785,7 @@
           <a:p>
             <a:fld id="{BA3D2166-DA3A-7E42-B5FA-B8909614B8FF}" type="datetimeFigureOut">
               <a:rPr lang="en-US" smtClean="0"/>
-              <a:t>2016-07-08</a:t>
+              <a:t>2016-07-14</a:t>
             </a:fld>
             <a:endParaRPr lang="en-US"/>
           </a:p>
@@ -1887,7 +1903,7 @@
           <a:p>
             <a:fld id="{BA3D2166-DA3A-7E42-B5FA-B8909614B8FF}" type="datetimeFigureOut">
               <a:rPr lang="en-US" smtClean="0"/>
-              <a:t>2016-07-08</a:t>
+              <a:t>2016-07-14</a:t>
             </a:fld>
             <a:endParaRPr lang="en-US"/>
           </a:p>
@@ -1982,7 +1998,7 @@
           <a:p>
             <a:fld id="{BA3D2166-DA3A-7E42-B5FA-B8909614B8FF}" type="datetimeFigureOut">
               <a:rPr lang="en-US" smtClean="0"/>
-              <a:t>2016-07-08</a:t>
+              <a:t>2016-07-14</a:t>
             </a:fld>
             <a:endParaRPr lang="en-US"/>
           </a:p>
@@ -2259,7 +2275,7 @@
           <a:p>
             <a:fld id="{BA3D2166-DA3A-7E42-B5FA-B8909614B8FF}" type="datetimeFigureOut">
               <a:rPr lang="en-US" smtClean="0"/>
-              <a:t>2016-07-08</a:t>
+              <a:t>2016-07-14</a:t>
             </a:fld>
             <a:endParaRPr lang="en-US"/>
           </a:p>
@@ -2512,7 +2528,7 @@
           <a:p>
             <a:fld id="{BA3D2166-DA3A-7E42-B5FA-B8909614B8FF}" type="datetimeFigureOut">
               <a:rPr lang="en-US" smtClean="0"/>
-              <a:t>2016-07-08</a:t>
+              <a:t>2016-07-14</a:t>
             </a:fld>
             <a:endParaRPr lang="en-US"/>
           </a:p>
@@ -2725,7 +2741,7 @@
           <a:p>
             <a:fld id="{BA3D2166-DA3A-7E42-B5FA-B8909614B8FF}" type="datetimeFigureOut">
               <a:rPr lang="en-US" smtClean="0"/>
-              <a:t>2016-07-08</a:t>
+              <a:t>2016-07-14</a:t>
             </a:fld>
             <a:endParaRPr lang="en-US"/>
           </a:p>
@@ -3120,8 +3136,8 @@
         </p:nvSpPr>
         <p:spPr bwMode="auto">
           <a:xfrm>
-            <a:off x="6182801" y="11955635"/>
-            <a:ext cx="15072665" cy="4356000"/>
+            <a:off x="6182801" y="10088940"/>
+            <a:ext cx="15072665" cy="6222695"/>
           </a:xfrm>
           <a:prstGeom prst="roundRect">
             <a:avLst>
@@ -3196,7 +3212,7 @@
           </a:xfrm>
           <a:prstGeom prst="roundRect">
             <a:avLst>
-              <a:gd name="adj" fmla="val 22352"/>
+              <a:gd name="adj" fmla="val 0"/>
             </a:avLst>
           </a:prstGeom>
           <a:ln w="28575" cmpd="sng">
@@ -3274,8 +3290,8 @@
         </p:blipFill>
         <p:spPr>
           <a:xfrm>
-            <a:off x="23692041" y="440212"/>
-            <a:ext cx="3057577" cy="1908000"/>
+            <a:off x="24820954" y="1368406"/>
+            <a:ext cx="2272960" cy="1418381"/>
           </a:xfrm>
           <a:prstGeom prst="rect">
             <a:avLst/>
@@ -3345,7 +3361,7 @@
         <p:spPr>
           <a:xfrm>
             <a:off x="258399" y="83239"/>
-            <a:ext cx="26852612" cy="1569660"/>
+            <a:ext cx="26852612" cy="830997"/>
           </a:xfrm>
           <a:prstGeom prst="rect">
             <a:avLst/>
@@ -3364,40 +3380,17 @@
                 <a:solidFill>
                   <a:srgbClr val="DA0000"/>
                 </a:solidFill>
+                <a:latin typeface="Times New Roman"/>
+                <a:cs typeface="Times New Roman"/>
               </a:rPr>
-              <a:t>An Empirical Comparison of Methods to Meta-Analyze Individual Patient </a:t>
-            </a:r>
-            <a:r>
-              <a:rPr lang="en-US" sz="4800" b="1" dirty="0">
-                <a:solidFill>
-                  <a:srgbClr val="DA0000"/>
-                </a:solidFill>
-              </a:rPr>
-              <a:t>D</a:t>
-            </a:r>
-            <a:r>
-              <a:rPr lang="en-US" sz="4800" b="1" dirty="0" smtClean="0">
-                <a:solidFill>
-                  <a:srgbClr val="DA0000"/>
-                </a:solidFill>
-              </a:rPr>
-              <a:t>ata of </a:t>
-            </a:r>
-          </a:p>
-          <a:p>
-            <a:pPr algn="ctr"/>
-            <a:r>
-              <a:rPr lang="en-US" sz="4800" b="1" dirty="0" smtClean="0">
-                <a:solidFill>
-                  <a:srgbClr val="DA0000"/>
-                </a:solidFill>
-              </a:rPr>
-              <a:t>Diagnostic Accuracy </a:t>
+              <a:t>TITLE</a:t>
             </a:r>
             <a:endParaRPr lang="en-US" sz="4800" b="1" dirty="0">
               <a:solidFill>
                 <a:srgbClr val="DA0000"/>
               </a:solidFill>
+              <a:latin typeface="Times New Roman"/>
+              <a:cs typeface="Times New Roman"/>
             </a:endParaRPr>
           </a:p>
         </p:txBody>
@@ -3426,50 +3419,51 @@
           <a:p>
             <a:pPr algn="ctr"/>
             <a:r>
-              <a:rPr lang="en-US" sz="3600" dirty="0" smtClean="0"/>
-              <a:t>G.Simoneau</a:t>
-            </a:r>
-            <a:r>
-              <a:rPr lang="en-US" sz="3600" baseline="30000" dirty="0" smtClean="0"/>
+              <a:rPr lang="en-US" sz="3600" dirty="0" smtClean="0">
+                <a:latin typeface="Times New Roman"/>
+                <a:cs typeface="Times New Roman"/>
+              </a:rPr>
+              <a:t>K.McGregor</a:t>
+            </a:r>
+            <a:r>
+              <a:rPr lang="en-US" sz="3600" baseline="30000" dirty="0" smtClean="0">
+                <a:latin typeface="Times New Roman"/>
+                <a:cs typeface="Times New Roman"/>
+              </a:rPr>
+              <a:t>1,2</a:t>
+            </a:r>
+            <a:r>
+              <a:rPr lang="en-US" sz="3600" dirty="0" smtClean="0">
+                <a:latin typeface="Times New Roman"/>
+                <a:cs typeface="Times New Roman"/>
+              </a:rPr>
+              <a:t> </a:t>
+            </a:r>
+            <a:r>
+              <a:rPr lang="en-US" sz="3000" dirty="0" smtClean="0">
+                <a:latin typeface="Times New Roman"/>
+                <a:cs typeface="Times New Roman"/>
+              </a:rPr>
+              <a:t>and</a:t>
+            </a:r>
+            <a:r>
+              <a:rPr lang="en-US" sz="3600" dirty="0" smtClean="0">
+                <a:latin typeface="Times New Roman"/>
+                <a:cs typeface="Times New Roman"/>
+              </a:rPr>
+              <a:t> G.Simoneau</a:t>
+            </a:r>
+            <a:r>
+              <a:rPr lang="en-US" sz="3600" baseline="30000" dirty="0" smtClean="0">
+                <a:latin typeface="Times New Roman"/>
+                <a:cs typeface="Times New Roman"/>
+              </a:rPr>
               <a:t>1</a:t>
             </a:r>
-            <a:r>
-              <a:rPr lang="en-US" sz="3600" dirty="0" smtClean="0"/>
-              <a:t> MSc, B.Levis</a:t>
-            </a:r>
-            <a:r>
-              <a:rPr lang="en-US" sz="3600" baseline="30000" dirty="0" smtClean="0"/>
-              <a:t>1</a:t>
-            </a:r>
-            <a:r>
-              <a:rPr lang="en-US" sz="3600" dirty="0" smtClean="0"/>
-              <a:t> MSc, </a:t>
-            </a:r>
-            <a:r>
-              <a:rPr lang="en-US" sz="3600" dirty="0"/>
-              <a:t>B.Thombs</a:t>
-            </a:r>
-            <a:r>
-              <a:rPr lang="en-US" sz="3600" baseline="30000" dirty="0"/>
-              <a:t>2</a:t>
-            </a:r>
-            <a:r>
-              <a:rPr lang="en-US" sz="3600" dirty="0"/>
-              <a:t> </a:t>
-            </a:r>
-            <a:r>
-              <a:rPr lang="en-US" sz="3600" dirty="0" smtClean="0"/>
-              <a:t>PhD, A.Benedetti</a:t>
-            </a:r>
-            <a:r>
-              <a:rPr lang="en-US" sz="3600" baseline="30000" dirty="0" smtClean="0"/>
-              <a:t>1</a:t>
-            </a:r>
-            <a:r>
-              <a:rPr lang="en-US" sz="3600" dirty="0" smtClean="0"/>
-              <a:t> PhD </a:t>
-            </a:r>
-            <a:endParaRPr lang="en-US" sz="3600" dirty="0"/>
+            <a:endParaRPr lang="en-US" sz="3600" dirty="0">
+              <a:latin typeface="Times New Roman"/>
+              <a:cs typeface="Times New Roman"/>
+            </a:endParaRPr>
           </a:p>
         </p:txBody>
       </p:sp>
@@ -3481,7 +3475,7 @@
         </p:nvSpPr>
         <p:spPr>
           <a:xfrm>
-            <a:off x="258398" y="2195204"/>
+            <a:off x="0" y="2218721"/>
             <a:ext cx="26852613" cy="523220"/>
           </a:xfrm>
           <a:prstGeom prst="rect">
@@ -3497,22 +3491,44 @@
           <a:p>
             <a:pPr algn="ctr"/>
             <a:r>
-              <a:rPr lang="en-US" sz="2800" baseline="30000" dirty="0" smtClean="0"/>
+              <a:rPr lang="en-US" sz="2800" baseline="30000" dirty="0" smtClean="0">
+                <a:latin typeface="Times New Roman"/>
+                <a:cs typeface="Times New Roman"/>
+              </a:rPr>
               <a:t>1 </a:t>
             </a:r>
             <a:r>
-              <a:rPr lang="en-US" sz="2800" dirty="0" smtClean="0"/>
+              <a:rPr lang="en-US" sz="2800" dirty="0" smtClean="0">
+                <a:latin typeface="Times New Roman"/>
+                <a:cs typeface="Times New Roman"/>
+              </a:rPr>
               <a:t>Department of Epidemiology, Biostatistics and Occupational Health, McGill University </a:t>
             </a:r>
             <a:r>
-              <a:rPr lang="en-US" sz="2800" baseline="30000" dirty="0" smtClean="0"/>
-              <a:t>2</a:t>
-            </a:r>
-            <a:r>
-              <a:rPr lang="en-US" sz="2800" dirty="0" smtClean="0"/>
-              <a:t> Department of Psychiatry, McGill University</a:t>
-            </a:r>
-            <a:endParaRPr lang="en-US" sz="2800" dirty="0"/>
+              <a:rPr lang="en-US" sz="2800" baseline="30000" dirty="0" smtClean="0">
+                <a:latin typeface="Times New Roman"/>
+                <a:cs typeface="Times New Roman"/>
+              </a:rPr>
+              <a:t>2 </a:t>
+            </a:r>
+            <a:r>
+              <a:rPr lang="en-US" sz="2800" dirty="0">
+                <a:latin typeface="Times New Roman"/>
+                <a:cs typeface="Times New Roman"/>
+              </a:rPr>
+              <a:t>Lady Davis Institute for Medical Research, Jewish General </a:t>
+            </a:r>
+            <a:r>
+              <a:rPr lang="en-US" sz="2800" dirty="0" smtClean="0">
+                <a:latin typeface="Times New Roman"/>
+                <a:cs typeface="Times New Roman"/>
+              </a:rPr>
+              <a:t>Hospital</a:t>
+            </a:r>
+            <a:endParaRPr lang="en-US" sz="2800" dirty="0">
+              <a:latin typeface="Times New Roman"/>
+              <a:cs typeface="Times New Roman"/>
+            </a:endParaRPr>
           </a:p>
         </p:txBody>
       </p:sp>
@@ -3526,8 +3542,8 @@
         </p:nvSpPr>
         <p:spPr bwMode="auto">
           <a:xfrm>
-            <a:off x="6182801" y="7506746"/>
-            <a:ext cx="15072665" cy="4356000"/>
+            <a:off x="6182801" y="3743884"/>
+            <a:ext cx="15072665" cy="6061877"/>
           </a:xfrm>
           <a:prstGeom prst="roundRect">
             <a:avLst>
@@ -3753,10 +3769,16 @@
           <a:p>
             <a:pPr algn="ctr"/>
             <a:r>
-              <a:rPr lang="en-US" sz="2800" b="1" dirty="0" smtClean="0"/>
+              <a:rPr lang="en-US" sz="2800" b="1" dirty="0" smtClean="0">
+                <a:latin typeface="Times New Roman"/>
+                <a:cs typeface="Times New Roman"/>
+              </a:rPr>
               <a:t>Background</a:t>
             </a:r>
-            <a:endParaRPr lang="en-US" sz="2800" b="1" dirty="0"/>
+            <a:endParaRPr lang="en-US" sz="2800" b="1" dirty="0">
+              <a:latin typeface="Times New Roman"/>
+              <a:cs typeface="Times New Roman"/>
+            </a:endParaRPr>
           </a:p>
         </p:txBody>
       </p:sp>
@@ -3768,7 +3790,7 @@
         </p:nvSpPr>
         <p:spPr>
           <a:xfrm>
-            <a:off x="270941" y="8471591"/>
+            <a:off x="270941" y="8636210"/>
             <a:ext cx="5662995" cy="523220"/>
           </a:xfrm>
           <a:prstGeom prst="rect">
@@ -3788,6 +3810,8 @@
                 <a:solidFill>
                   <a:srgbClr val="000000"/>
                 </a:solidFill>
+                <a:latin typeface="Times New Roman"/>
+                <a:cs typeface="Times New Roman"/>
               </a:rPr>
               <a:t>Objective</a:t>
             </a:r>
@@ -3795,6 +3819,8 @@
               <a:solidFill>
                 <a:srgbClr val="000000"/>
               </a:solidFill>
+              <a:latin typeface="Times New Roman"/>
+              <a:cs typeface="Times New Roman"/>
             </a:endParaRPr>
           </a:p>
         </p:txBody>
@@ -3807,7 +3833,7 @@
         </p:nvSpPr>
         <p:spPr>
           <a:xfrm>
-            <a:off x="6981031" y="6937406"/>
+            <a:off x="6981031" y="3178026"/>
             <a:ext cx="13481553" cy="523220"/>
           </a:xfrm>
           <a:prstGeom prst="rect">
@@ -3827,6 +3853,8 @@
                 <a:solidFill>
                   <a:srgbClr val="FFFFFF"/>
                 </a:solidFill>
+                <a:latin typeface="Times New Roman"/>
+                <a:cs typeface="Times New Roman"/>
               </a:rPr>
               <a:t>Results</a:t>
             </a:r>
@@ -3834,6 +3862,8 @@
               <a:solidFill>
                 <a:srgbClr val="FFFFFF"/>
               </a:solidFill>
+              <a:latin typeface="Times New Roman"/>
+              <a:cs typeface="Times New Roman"/>
             </a:endParaRPr>
           </a:p>
         </p:txBody>
@@ -3862,10 +3892,16 @@
           <a:p>
             <a:pPr algn="ctr"/>
             <a:r>
-              <a:rPr lang="en-US" sz="2800" b="1" dirty="0" smtClean="0"/>
+              <a:rPr lang="en-US" sz="2800" b="1" dirty="0" smtClean="0">
+                <a:latin typeface="Times New Roman"/>
+                <a:cs typeface="Times New Roman"/>
+              </a:rPr>
               <a:t>Conclusion</a:t>
             </a:r>
-            <a:endParaRPr lang="en-US" sz="2800" b="1" dirty="0"/>
+            <a:endParaRPr lang="en-US" sz="2800" b="1" dirty="0">
+              <a:latin typeface="Times New Roman"/>
+              <a:cs typeface="Times New Roman"/>
+            </a:endParaRPr>
           </a:p>
         </p:txBody>
       </p:sp>
@@ -3893,349 +3929,15 @@
           <a:p>
             <a:pPr algn="ctr"/>
             <a:r>
-              <a:rPr lang="en-US" sz="2800" b="1" dirty="0" smtClean="0"/>
+              <a:rPr lang="en-US" sz="2800" b="1" dirty="0" smtClean="0">
+                <a:latin typeface="Times New Roman"/>
+                <a:cs typeface="Times New Roman"/>
+              </a:rPr>
               <a:t>References</a:t>
             </a:r>
-            <a:endParaRPr lang="en-US" sz="2800" b="1" dirty="0"/>
-          </a:p>
-        </p:txBody>
-      </p:sp>
-      <p:sp>
-        <p:nvSpPr>
-          <p:cNvPr id="31" name="Rounded Rectangle 6"/>
-          <p:cNvSpPr>
-            <a:spLocks noChangeArrowheads="1"/>
-          </p:cNvSpPr>
-          <p:nvPr/>
-        </p:nvSpPr>
-        <p:spPr bwMode="auto">
-          <a:xfrm>
-            <a:off x="6170891" y="3434928"/>
-            <a:ext cx="4968000" cy="3564088"/>
-          </a:xfrm>
-          <a:prstGeom prst="roundRect">
-            <a:avLst>
-              <a:gd name="adj" fmla="val 12865"/>
-            </a:avLst>
-          </a:prstGeom>
-          <a:ln w="28575" cmpd="sng">
-            <a:solidFill>
-              <a:schemeClr val="accent1">
-                <a:lumMod val="75000"/>
-              </a:schemeClr>
-            </a:solidFill>
-            <a:headEnd/>
-            <a:tailEnd/>
-          </a:ln>
-        </p:spPr>
-        <p:style>
-          <a:lnRef idx="2">
-            <a:schemeClr val="accent1"/>
-          </a:lnRef>
-          <a:fillRef idx="1">
-            <a:schemeClr val="lt1"/>
-          </a:fillRef>
-          <a:effectRef idx="0">
-            <a:schemeClr val="accent1"/>
-          </a:effectRef>
-          <a:fontRef idx="minor">
-            <a:schemeClr val="dk1"/>
-          </a:fontRef>
-        </p:style>
-        <p:txBody>
-          <a:bodyPr anchor="ctr"/>
-          <a:lstStyle/>
-          <a:p>
-            <a:pPr algn="ctr" defTabSz="2875129" fontAlgn="auto">
-              <a:spcBef>
-                <a:spcPts val="0"/>
-              </a:spcBef>
-              <a:spcAft>
-                <a:spcPts val="0"/>
-              </a:spcAft>
-              <a:defRPr/>
-            </a:pPr>
-            <a:endParaRPr lang="en-US" dirty="0">
-              <a:ln w="12700" cmpd="sng">
-                <a:solidFill>
-                  <a:schemeClr val="tx1"/>
-                </a:solidFill>
-              </a:ln>
-              <a:solidFill>
-                <a:schemeClr val="lt1"/>
-              </a:solidFill>
-              <a:latin typeface="+mn-lt"/>
-              <a:ea typeface="+mn-ea"/>
-              <a:cs typeface="+mn-cs"/>
-            </a:endParaRPr>
-          </a:p>
-        </p:txBody>
-      </p:sp>
-      <p:sp>
-        <p:nvSpPr>
-          <p:cNvPr id="32" name="Rounded Rectangle 6"/>
-          <p:cNvSpPr>
-            <a:spLocks noChangeArrowheads="1"/>
-          </p:cNvSpPr>
-          <p:nvPr/>
-        </p:nvSpPr>
-        <p:spPr bwMode="auto">
-          <a:xfrm>
-            <a:off x="11216495" y="3448828"/>
-            <a:ext cx="4968000" cy="3550188"/>
-          </a:xfrm>
-          <a:prstGeom prst="roundRect">
-            <a:avLst>
-              <a:gd name="adj" fmla="val 12865"/>
-            </a:avLst>
-          </a:prstGeom>
-          <a:ln w="28575" cmpd="sng">
-            <a:solidFill>
-              <a:schemeClr val="accent1">
-                <a:lumMod val="75000"/>
-              </a:schemeClr>
-            </a:solidFill>
-            <a:headEnd/>
-            <a:tailEnd/>
-          </a:ln>
-        </p:spPr>
-        <p:style>
-          <a:lnRef idx="2">
-            <a:schemeClr val="accent1"/>
-          </a:lnRef>
-          <a:fillRef idx="1">
-            <a:schemeClr val="lt1"/>
-          </a:fillRef>
-          <a:effectRef idx="0">
-            <a:schemeClr val="accent1"/>
-          </a:effectRef>
-          <a:fontRef idx="minor">
-            <a:schemeClr val="dk1"/>
-          </a:fontRef>
-        </p:style>
-        <p:txBody>
-          <a:bodyPr anchor="ctr"/>
-          <a:lstStyle/>
-          <a:p>
-            <a:pPr algn="ctr" defTabSz="2875129" fontAlgn="auto">
-              <a:spcBef>
-                <a:spcPts val="0"/>
-              </a:spcBef>
-              <a:spcAft>
-                <a:spcPts val="0"/>
-              </a:spcAft>
-              <a:defRPr/>
-            </a:pPr>
-            <a:endParaRPr lang="en-US" dirty="0">
-              <a:ln w="12700" cmpd="sng">
-                <a:solidFill>
-                  <a:schemeClr val="tx1"/>
-                </a:solidFill>
-              </a:ln>
-              <a:solidFill>
-                <a:schemeClr val="lt1"/>
-              </a:solidFill>
-              <a:latin typeface="+mn-lt"/>
-              <a:ea typeface="+mn-ea"/>
-              <a:cs typeface="+mn-cs"/>
-            </a:endParaRPr>
-          </a:p>
-        </p:txBody>
-      </p:sp>
-      <p:sp>
-        <p:nvSpPr>
-          <p:cNvPr id="33" name="Rounded Rectangle 6"/>
-          <p:cNvSpPr>
-            <a:spLocks noChangeArrowheads="1"/>
-          </p:cNvSpPr>
-          <p:nvPr/>
-        </p:nvSpPr>
-        <p:spPr bwMode="auto">
-          <a:xfrm>
-            <a:off x="16275556" y="3434928"/>
-            <a:ext cx="4968000" cy="3564088"/>
-          </a:xfrm>
-          <a:prstGeom prst="roundRect">
-            <a:avLst>
-              <a:gd name="adj" fmla="val 12865"/>
-            </a:avLst>
-          </a:prstGeom>
-          <a:ln>
-            <a:solidFill>
-              <a:srgbClr val="376092"/>
-            </a:solidFill>
-            <a:headEnd/>
-            <a:tailEnd/>
-          </a:ln>
-        </p:spPr>
-        <p:style>
-          <a:lnRef idx="2">
-            <a:schemeClr val="accent1"/>
-          </a:lnRef>
-          <a:fillRef idx="1">
-            <a:schemeClr val="lt1"/>
-          </a:fillRef>
-          <a:effectRef idx="0">
-            <a:schemeClr val="accent1"/>
-          </a:effectRef>
-          <a:fontRef idx="minor">
-            <a:schemeClr val="dk1"/>
-          </a:fontRef>
-        </p:style>
-        <p:txBody>
-          <a:bodyPr anchor="ctr"/>
-          <a:lstStyle/>
-          <a:p>
-            <a:pPr algn="ctr" defTabSz="2875129" fontAlgn="auto">
-              <a:spcBef>
-                <a:spcPts val="0"/>
-              </a:spcBef>
-              <a:spcAft>
-                <a:spcPts val="0"/>
-              </a:spcAft>
-              <a:defRPr/>
-            </a:pPr>
-            <a:endParaRPr lang="en-US" dirty="0">
-              <a:ln w="12700" cmpd="sng">
-                <a:solidFill>
-                  <a:schemeClr val="tx1"/>
-                </a:solidFill>
-              </a:ln>
-              <a:solidFill>
-                <a:schemeClr val="lt1"/>
-              </a:solidFill>
-              <a:latin typeface="+mn-lt"/>
-              <a:ea typeface="+mn-ea"/>
-              <a:cs typeface="+mn-cs"/>
-            </a:endParaRPr>
-          </a:p>
-        </p:txBody>
-      </p:sp>
-      <p:sp>
-        <p:nvSpPr>
-          <p:cNvPr id="28" name="TextBox 27"/>
-          <p:cNvSpPr txBox="1"/>
-          <p:nvPr/>
-        </p:nvSpPr>
-        <p:spPr>
-          <a:xfrm>
-            <a:off x="6182801" y="3014697"/>
-            <a:ext cx="4967999" cy="646331"/>
-          </a:xfrm>
-          <a:prstGeom prst="rect">
-            <a:avLst/>
-          </a:prstGeom>
-          <a:noFill/>
-        </p:spPr>
-        <p:txBody>
-          <a:bodyPr wrap="square" rtlCol="0">
-            <a:spAutoFit/>
-          </a:bodyPr>
-          <a:lstStyle/>
-          <a:p>
-            <a:pPr algn="ctr"/>
-            <a:r>
-              <a:rPr lang="en-US" sz="2000" b="1" dirty="0" smtClean="0">
-                <a:solidFill>
-                  <a:srgbClr val="FFFFFF"/>
-                </a:solidFill>
-                <a:latin typeface="Trebuchet MS"/>
-                <a:cs typeface="Trebuchet MS"/>
-              </a:rPr>
-              <a:t>Bivariate random-effects model [2]</a:t>
-            </a:r>
-          </a:p>
-          <a:p>
-            <a:endParaRPr lang="en-US" sz="1600" dirty="0">
-              <a:latin typeface="Trebuchet MS"/>
-              <a:cs typeface="Trebuchet MS"/>
-            </a:endParaRPr>
-          </a:p>
-        </p:txBody>
-      </p:sp>
-      <p:sp>
-        <p:nvSpPr>
-          <p:cNvPr id="29" name="TextBox 28"/>
-          <p:cNvSpPr txBox="1"/>
-          <p:nvPr/>
-        </p:nvSpPr>
-        <p:spPr>
-          <a:xfrm>
-            <a:off x="11212613" y="3041655"/>
-            <a:ext cx="4968000" cy="646331"/>
-          </a:xfrm>
-          <a:prstGeom prst="rect">
-            <a:avLst/>
-          </a:prstGeom>
-          <a:noFill/>
-        </p:spPr>
-        <p:txBody>
-          <a:bodyPr wrap="square" rtlCol="0">
-            <a:spAutoFit/>
-          </a:bodyPr>
-          <a:lstStyle/>
-          <a:p>
-            <a:pPr algn="ctr"/>
-            <a:r>
-              <a:rPr lang="en-US" sz="2000" b="1" dirty="0" smtClean="0">
-                <a:solidFill>
-                  <a:schemeClr val="bg1"/>
-                </a:solidFill>
-                <a:latin typeface="Trebuchet MS"/>
-                <a:cs typeface="Trebuchet MS"/>
-              </a:rPr>
-              <a:t>Ordinal multivariate mixed model [3]</a:t>
-            </a:r>
-          </a:p>
-          <a:p>
-            <a:endParaRPr lang="en-US" sz="1600" dirty="0">
-              <a:latin typeface="Trebuchet MS"/>
-              <a:cs typeface="Trebuchet MS"/>
-            </a:endParaRPr>
-          </a:p>
-        </p:txBody>
-      </p:sp>
-      <p:sp>
-        <p:nvSpPr>
-          <p:cNvPr id="30" name="TextBox 29"/>
-          <p:cNvSpPr txBox="1"/>
-          <p:nvPr/>
-        </p:nvSpPr>
-        <p:spPr>
-          <a:xfrm>
-            <a:off x="16288617" y="3035997"/>
-            <a:ext cx="4942968" cy="707886"/>
-          </a:xfrm>
-          <a:prstGeom prst="rect">
-            <a:avLst/>
-          </a:prstGeom>
-          <a:noFill/>
-        </p:spPr>
-        <p:txBody>
-          <a:bodyPr wrap="square" rtlCol="0">
-            <a:spAutoFit/>
-          </a:bodyPr>
-          <a:lstStyle/>
-          <a:p>
-            <a:pPr algn="ctr"/>
-            <a:r>
-              <a:rPr lang="en-US" sz="2000" b="1" dirty="0" smtClean="0">
-                <a:solidFill>
-                  <a:srgbClr val="FFFFFF"/>
-                </a:solidFill>
-                <a:latin typeface="Trebuchet MS"/>
-                <a:cs typeface="Trebuchet MS"/>
-              </a:rPr>
-              <a:t>Normal multivariate mixed model [6]</a:t>
-            </a:r>
-          </a:p>
-          <a:p>
-            <a:endParaRPr lang="en-US" sz="2000" dirty="0">
-              <a:solidFill>
-                <a:srgbClr val="FFFFFF"/>
-              </a:solidFill>
-              <a:latin typeface="Trebuchet MS"/>
-              <a:cs typeface="Trebuchet MS"/>
+            <a:endParaRPr lang="en-US" sz="2800" b="1" dirty="0">
+              <a:latin typeface="Times New Roman"/>
+              <a:cs typeface="Times New Roman"/>
             </a:endParaRPr>
           </a:p>
         </p:txBody>
@@ -4248,7 +3950,7 @@
         </p:nvSpPr>
         <p:spPr>
           <a:xfrm>
-            <a:off x="258398" y="11544602"/>
+            <a:off x="258398" y="9991485"/>
             <a:ext cx="5675538" cy="528617"/>
           </a:xfrm>
           <a:prstGeom prst="rect">
@@ -4268,6 +3970,8 @@
                 <a:solidFill>
                   <a:srgbClr val="000000"/>
                 </a:solidFill>
+                <a:latin typeface="Times New Roman"/>
+                <a:cs typeface="Times New Roman"/>
               </a:rPr>
               <a:t>Methods</a:t>
             </a:r>
@@ -4275,6 +3979,433 @@
               <a:solidFill>
                 <a:srgbClr val="000000"/>
               </a:solidFill>
+              <a:latin typeface="Times New Roman"/>
+              <a:cs typeface="Times New Roman"/>
+            </a:endParaRPr>
+          </a:p>
+        </p:txBody>
+      </p:sp>
+      <p:pic>
+        <p:nvPicPr>
+          <p:cNvPr id="3" name="Picture 2" descr="Logo-FRQNT.png"/>
+          <p:cNvPicPr>
+            <a:picLocks noChangeAspect="1"/>
+          </p:cNvPicPr>
+          <p:nvPr/>
+        </p:nvPicPr>
+        <p:blipFill>
+          <a:blip r:embed="rId4">
+            <a:extLst>
+              <a:ext uri="{28A0092B-C50C-407E-A947-70E740481C1C}">
+                <a14:useLocalDpi xmlns:a14="http://schemas.microsoft.com/office/drawing/2010/main" val="0"/>
+              </a:ext>
+            </a:extLst>
+          </a:blip>
+          <a:stretch>
+            <a:fillRect/>
+          </a:stretch>
+        </p:blipFill>
+        <p:spPr>
+          <a:xfrm>
+            <a:off x="24224593" y="171328"/>
+            <a:ext cx="2869322" cy="1247924"/>
+          </a:xfrm>
+          <a:prstGeom prst="rect">
+            <a:avLst/>
+          </a:prstGeom>
+        </p:spPr>
+      </p:pic>
+      <p:sp>
+        <p:nvSpPr>
+          <p:cNvPr id="4" name="TextBox 3"/>
+          <p:cNvSpPr txBox="1"/>
+          <p:nvPr/>
+        </p:nvSpPr>
+        <p:spPr>
+          <a:xfrm>
+            <a:off x="258399" y="3743884"/>
+            <a:ext cx="5675537" cy="4801315"/>
+          </a:xfrm>
+          <a:prstGeom prst="rect">
+            <a:avLst/>
+          </a:prstGeom>
+          <a:noFill/>
+        </p:spPr>
+        <p:txBody>
+          <a:bodyPr wrap="square" rtlCol="0">
+            <a:spAutoFit/>
+          </a:bodyPr>
+          <a:lstStyle/>
+          <a:p>
+            <a:pPr marL="342900" lvl="0" indent="-342900">
+              <a:buFont typeface="Arial"/>
+              <a:buChar char="•"/>
+            </a:pPr>
+            <a:r>
+              <a:rPr lang="en-US" sz="1800" dirty="0" smtClean="0">
+                <a:latin typeface="Times New Roman"/>
+                <a:cs typeface="Times New Roman"/>
+              </a:rPr>
+              <a:t>The International Mouse Phenotype Consortium (IMPC) is an international collaboration aimed at discovering functional insight for every gene through the systematic </a:t>
+            </a:r>
+            <a:r>
+              <a:rPr lang="en-US" sz="1800" dirty="0" err="1" smtClean="0">
+                <a:latin typeface="Times New Roman"/>
+                <a:cs typeface="Times New Roman"/>
+              </a:rPr>
+              <a:t>phenotyping</a:t>
+            </a:r>
+            <a:r>
+              <a:rPr lang="en-US" sz="1800" dirty="0" smtClean="0">
+                <a:latin typeface="Times New Roman"/>
+                <a:cs typeface="Times New Roman"/>
+              </a:rPr>
+              <a:t> of 20,000 knockout mouse strains.</a:t>
+            </a:r>
+          </a:p>
+          <a:p>
+            <a:pPr marL="342900" lvl="0" indent="-342900">
+              <a:buFont typeface="Arial"/>
+              <a:buChar char="•"/>
+            </a:pPr>
+            <a:r>
+              <a:rPr lang="en-US" sz="1800" dirty="0" smtClean="0">
+                <a:latin typeface="Times New Roman"/>
+                <a:cs typeface="Times New Roman"/>
+              </a:rPr>
+              <a:t>The knockout procedure turns off the activity of a mouse gene in order to assess what biological systems are impacted.</a:t>
+            </a:r>
+          </a:p>
+          <a:p>
+            <a:pPr marL="342900" lvl="0" indent="-342900">
+              <a:buFont typeface="Arial"/>
+              <a:buChar char="•"/>
+            </a:pPr>
+            <a:r>
+              <a:rPr lang="en-US" sz="1800" dirty="0" smtClean="0">
+                <a:latin typeface="Times New Roman"/>
+                <a:cs typeface="Times New Roman"/>
+              </a:rPr>
+              <a:t>Available data: 22 phenotypic measurements on 614 mice from 190 litters, representing 14 genotypes (wild type and 13 different knockout conditions).</a:t>
+            </a:r>
+          </a:p>
+          <a:p>
+            <a:pPr marL="342900" lvl="0" indent="-342900">
+              <a:buFont typeface="Arial"/>
+              <a:buChar char="•"/>
+            </a:pPr>
+            <a:r>
+              <a:rPr lang="en-US" sz="1800" dirty="0" smtClean="0">
+                <a:latin typeface="Times New Roman"/>
+                <a:cs typeface="Times New Roman"/>
+              </a:rPr>
+              <a:t>Phenotypic measurements are likely to vary across litters and genotypes.</a:t>
+            </a:r>
+          </a:p>
+          <a:p>
+            <a:pPr marL="342900" lvl="0" indent="-342900">
+              <a:buFont typeface="Arial"/>
+              <a:buChar char="•"/>
+            </a:pPr>
+            <a:r>
+              <a:rPr lang="en-US" sz="1800" dirty="0" smtClean="0">
+                <a:latin typeface="Times New Roman"/>
+                <a:cs typeface="Times New Roman"/>
+              </a:rPr>
+              <a:t>Missing data: 5 knockout conditions were randomly selected for which all observations from a randomly selected variable (different for each condition) were removed. The dataset comprises 67 missing values.</a:t>
+            </a:r>
+            <a:endParaRPr lang="en-CA" sz="1800" dirty="0">
+              <a:latin typeface="Times New Roman"/>
+              <a:cs typeface="Times New Roman"/>
+            </a:endParaRPr>
+          </a:p>
+        </p:txBody>
+      </p:sp>
+      <p:sp>
+        <p:nvSpPr>
+          <p:cNvPr id="6" name="TextBox 5"/>
+          <p:cNvSpPr txBox="1"/>
+          <p:nvPr/>
+        </p:nvSpPr>
+        <p:spPr>
+          <a:xfrm>
+            <a:off x="258399" y="9159430"/>
+            <a:ext cx="5688750" cy="646331"/>
+          </a:xfrm>
+          <a:prstGeom prst="rect">
+            <a:avLst/>
+          </a:prstGeom>
+          <a:noFill/>
+        </p:spPr>
+        <p:txBody>
+          <a:bodyPr wrap="square" rtlCol="0">
+            <a:spAutoFit/>
+          </a:bodyPr>
+          <a:lstStyle/>
+          <a:p>
+            <a:pPr marL="342900" indent="-342900">
+              <a:buFont typeface="+mj-lt"/>
+              <a:buAutoNum type="arabicPeriod"/>
+            </a:pPr>
+            <a:r>
+              <a:rPr lang="en-US" sz="1800" dirty="0" smtClean="0">
+                <a:latin typeface="Times New Roman"/>
+                <a:cs typeface="Times New Roman"/>
+              </a:rPr>
+              <a:t>To infer missing data.</a:t>
+            </a:r>
+          </a:p>
+          <a:p>
+            <a:pPr marL="342900" indent="-342900">
+              <a:buFont typeface="+mj-lt"/>
+              <a:buAutoNum type="arabicPeriod"/>
+            </a:pPr>
+            <a:r>
+              <a:rPr lang="en-US" sz="1800" dirty="0">
+                <a:latin typeface="Times New Roman"/>
+                <a:cs typeface="Times New Roman"/>
+              </a:rPr>
+              <a:t>To produce a causal interpretation of the available data</a:t>
+            </a:r>
+            <a:r>
+              <a:rPr lang="en-US" sz="1800" dirty="0" smtClean="0">
+                <a:latin typeface="Times New Roman"/>
+                <a:cs typeface="Times New Roman"/>
+              </a:rPr>
+              <a:t>.</a:t>
+            </a:r>
+            <a:endParaRPr lang="en-US" sz="1800" dirty="0">
+              <a:latin typeface="Times New Roman"/>
+              <a:cs typeface="Times New Roman"/>
+            </a:endParaRPr>
+          </a:p>
+        </p:txBody>
+      </p:sp>
+      <p:sp>
+        <p:nvSpPr>
+          <p:cNvPr id="7" name="TextBox 6"/>
+          <p:cNvSpPr txBox="1"/>
+          <p:nvPr/>
+        </p:nvSpPr>
+        <p:spPr>
+          <a:xfrm>
+            <a:off x="258399" y="10629839"/>
+            <a:ext cx="5675537" cy="2862323"/>
+          </a:xfrm>
+          <a:prstGeom prst="rect">
+            <a:avLst/>
+          </a:prstGeom>
+          <a:noFill/>
+        </p:spPr>
+        <p:txBody>
+          <a:bodyPr wrap="square" rtlCol="0">
+            <a:spAutoFit/>
+          </a:bodyPr>
+          <a:lstStyle/>
+          <a:p>
+            <a:r>
+              <a:rPr lang="en-US" sz="1800" dirty="0" smtClean="0">
+                <a:latin typeface="Times New Roman"/>
+                <a:cs typeface="Times New Roman"/>
+              </a:rPr>
+              <a:t>Predictions for the 67 missing values are obtained with </a:t>
+            </a:r>
+            <a:r>
+              <a:rPr lang="en-US" sz="1800" b="1" dirty="0" smtClean="0">
+                <a:latin typeface="Times New Roman"/>
+                <a:cs typeface="Times New Roman"/>
+              </a:rPr>
+              <a:t>Multiple Imputation using Chained Equations</a:t>
+            </a:r>
+            <a:r>
+              <a:rPr lang="en-US" sz="1800" dirty="0" smtClean="0">
+                <a:latin typeface="Times New Roman"/>
+                <a:cs typeface="Times New Roman"/>
+              </a:rPr>
+              <a:t> (MICE):</a:t>
+            </a:r>
+          </a:p>
+          <a:p>
+            <a:pPr marL="285750" indent="-285750">
+              <a:buFont typeface="Arial"/>
+              <a:buChar char="•"/>
+            </a:pPr>
+            <a:r>
+              <a:rPr lang="en-US" sz="1800" dirty="0" smtClean="0">
+                <a:latin typeface="Times New Roman"/>
+                <a:cs typeface="Times New Roman"/>
+              </a:rPr>
+              <a:t> the unknown missing values are replaced by 20 independent simulated sets of values drawn from the posterior predictive distribution of the missing data conditional on the observed data.</a:t>
+            </a:r>
+          </a:p>
+          <a:p>
+            <a:pPr marL="285750" indent="-285750">
+              <a:buFont typeface="Arial"/>
+              <a:buChar char="•"/>
+            </a:pPr>
+            <a:r>
+              <a:rPr lang="en-US" sz="1800" dirty="0" smtClean="0">
+                <a:latin typeface="Times New Roman"/>
+                <a:cs typeface="Times New Roman"/>
+              </a:rPr>
+              <a:t>Predictions are obtained by averaging the imputed values across the 20 simulated dataset.</a:t>
+            </a:r>
+          </a:p>
+          <a:p>
+            <a:pPr marL="285750" indent="-285750">
+              <a:buFont typeface="Arial"/>
+              <a:buChar char="•"/>
+            </a:pPr>
+            <a:r>
+              <a:rPr lang="en-US" sz="1800" dirty="0" smtClean="0">
+                <a:latin typeface="Times New Roman"/>
+                <a:cs typeface="Times New Roman"/>
+              </a:rPr>
+              <a:t>Assumes missing data are missing at random or completely at random</a:t>
+            </a:r>
+            <a:endParaRPr lang="en-US" sz="1800" dirty="0">
+              <a:latin typeface="Times New Roman"/>
+              <a:cs typeface="Times New Roman"/>
+            </a:endParaRPr>
+          </a:p>
+        </p:txBody>
+      </p:sp>
+      <p:sp>
+        <p:nvSpPr>
+          <p:cNvPr id="34" name="TextBox 33"/>
+          <p:cNvSpPr txBox="1"/>
+          <p:nvPr/>
+        </p:nvSpPr>
+        <p:spPr>
+          <a:xfrm>
+            <a:off x="21473796" y="3252775"/>
+            <a:ext cx="5724000" cy="523220"/>
+          </a:xfrm>
+          <a:prstGeom prst="rect">
+            <a:avLst/>
+          </a:prstGeom>
+          <a:noFill/>
+        </p:spPr>
+        <p:txBody>
+          <a:bodyPr wrap="square" rtlCol="0">
+            <a:spAutoFit/>
+          </a:bodyPr>
+          <a:lstStyle/>
+          <a:p>
+            <a:pPr algn="ctr"/>
+            <a:r>
+              <a:rPr lang="en-US" sz="2800" b="1" dirty="0" smtClean="0">
+                <a:latin typeface="Times New Roman"/>
+                <a:cs typeface="Times New Roman"/>
+              </a:rPr>
+              <a:t>Discussion</a:t>
+            </a:r>
+            <a:endParaRPr lang="en-US" sz="2800" b="1" dirty="0">
+              <a:latin typeface="Times New Roman"/>
+              <a:cs typeface="Times New Roman"/>
+            </a:endParaRPr>
+          </a:p>
+        </p:txBody>
+      </p:sp>
+      <p:sp>
+        <p:nvSpPr>
+          <p:cNvPr id="9" name="TextBox 8"/>
+          <p:cNvSpPr txBox="1"/>
+          <p:nvPr/>
+        </p:nvSpPr>
+        <p:spPr>
+          <a:xfrm>
+            <a:off x="258399" y="13428403"/>
+            <a:ext cx="5675537" cy="369332"/>
+          </a:xfrm>
+          <a:prstGeom prst="rect">
+            <a:avLst/>
+          </a:prstGeom>
+          <a:noFill/>
+        </p:spPr>
+        <p:txBody>
+          <a:bodyPr wrap="square" rtlCol="0">
+            <a:spAutoFit/>
+          </a:bodyPr>
+          <a:lstStyle/>
+          <a:p>
+            <a:r>
+              <a:rPr lang="en-US" sz="1800" dirty="0" smtClean="0">
+                <a:latin typeface="Times New Roman"/>
+                <a:cs typeface="Times New Roman"/>
+              </a:rPr>
+              <a:t>Causal interpretation of the data method</a:t>
+            </a:r>
+          </a:p>
+        </p:txBody>
+      </p:sp>
+      <p:sp>
+        <p:nvSpPr>
+          <p:cNvPr id="18" name="TextBox 17"/>
+          <p:cNvSpPr txBox="1"/>
+          <p:nvPr/>
+        </p:nvSpPr>
+        <p:spPr>
+          <a:xfrm>
+            <a:off x="21504772" y="11852741"/>
+            <a:ext cx="5927228" cy="923330"/>
+          </a:xfrm>
+          <a:prstGeom prst="rect">
+            <a:avLst/>
+          </a:prstGeom>
+          <a:noFill/>
+        </p:spPr>
+        <p:txBody>
+          <a:bodyPr wrap="square" rtlCol="0">
+            <a:spAutoFit/>
+          </a:bodyPr>
+          <a:lstStyle/>
+          <a:p>
+            <a:r>
+              <a:rPr lang="en-US" sz="1800" dirty="0" smtClean="0">
+                <a:latin typeface="Times New Roman"/>
+                <a:cs typeface="Times New Roman"/>
+              </a:rPr>
+              <a:t>White</a:t>
+            </a:r>
+            <a:r>
+              <a:rPr lang="en-US" sz="1800" dirty="0">
+                <a:latin typeface="Times New Roman"/>
+                <a:cs typeface="Times New Roman"/>
+              </a:rPr>
+              <a:t>, I. R., Royston, P., &amp; Wood, A. M. (2011). Multiple imputation using chained equations: issues and guidance for practice. </a:t>
+            </a:r>
+            <a:r>
+              <a:rPr lang="en-US" sz="1800" i="1" dirty="0">
+                <a:latin typeface="Times New Roman"/>
+                <a:cs typeface="Times New Roman"/>
+              </a:rPr>
+              <a:t>Statistics in medicine</a:t>
+            </a:r>
+            <a:r>
+              <a:rPr lang="en-US" sz="1800" dirty="0">
+                <a:latin typeface="Times New Roman"/>
+                <a:cs typeface="Times New Roman"/>
+              </a:rPr>
+              <a:t>, </a:t>
+            </a:r>
+            <a:r>
+              <a:rPr lang="en-US" sz="1800" i="1" dirty="0">
+                <a:latin typeface="Times New Roman"/>
+                <a:cs typeface="Times New Roman"/>
+              </a:rPr>
+              <a:t>30</a:t>
+            </a:r>
+            <a:r>
+              <a:rPr lang="en-US" sz="1800" dirty="0">
+                <a:latin typeface="Times New Roman"/>
+                <a:cs typeface="Times New Roman"/>
+              </a:rPr>
+              <a:t>(4), 377-399.</a:t>
+            </a:r>
+            <a:endParaRPr lang="en-US" sz="1800" dirty="0">
+              <a:latin typeface="Times New Roman"/>
+              <a:cs typeface="Times New Roman"/>
             </a:endParaRPr>
           </a:p>
         </p:txBody>

</xml_diff>

<commit_message>
Added one table. Need to find the good green that fits the figures :O
</commit_message>
<xml_diff>
--- a/Poster.pptx
+++ b/Poster.pptx
@@ -4549,6 +4549,753 @@
           </a:p>
         </p:txBody>
       </p:sp>
+      <p:graphicFrame>
+        <p:nvGraphicFramePr>
+          <p:cNvPr id="26" name="Table 25"/>
+          <p:cNvGraphicFramePr>
+            <a:graphicFrameLocks noGrp="1"/>
+          </p:cNvGraphicFramePr>
+          <p:nvPr>
+            <p:extLst>
+              <p:ext uri="{D42A27DB-BD31-4B8C-83A1-F6EECF244321}">
+                <p14:modId xmlns:p14="http://schemas.microsoft.com/office/powerpoint/2010/main" val="527268647"/>
+              </p:ext>
+            </p:extLst>
+          </p:nvPr>
+        </p:nvGraphicFramePr>
+        <p:xfrm>
+          <a:off x="7122140" y="9137904"/>
+          <a:ext cx="4291124" cy="2796925"/>
+        </p:xfrm>
+        <a:graphic>
+          <a:graphicData uri="http://schemas.openxmlformats.org/drawingml/2006/table">
+            <a:tbl>
+              <a:tblPr firstRow="1" bandRow="1">
+                <a:tableStyleId>{F2DE63D5-997A-4646-A377-4702673A728D}</a:tableStyleId>
+              </a:tblPr>
+              <a:tblGrid>
+                <a:gridCol w="844006"/>
+                <a:gridCol w="2137686"/>
+                <a:gridCol w="536394"/>
+                <a:gridCol w="773038"/>
+              </a:tblGrid>
+              <a:tr h="510925">
+                <a:tc>
+                  <a:txBody>
+                    <a:bodyPr/>
+                    <a:lstStyle/>
+                    <a:p>
+                      <a:pPr algn="l"/>
+                      <a:r>
+                        <a:rPr lang="en-US" sz="1200" dirty="0" smtClean="0">
+                          <a:latin typeface="Times New Roman"/>
+                          <a:cs typeface="Times New Roman"/>
+                        </a:rPr>
+                        <a:t>Knockout</a:t>
+                      </a:r>
+                      <a:endParaRPr lang="en-US" sz="1200" dirty="0">
+                        <a:latin typeface="Times New Roman"/>
+                        <a:cs typeface="Times New Roman"/>
+                      </a:endParaRPr>
+                    </a:p>
+                  </a:txBody>
+                  <a:tcPr anchor="b">
+                    <a:solidFill>
+                      <a:srgbClr val="045C0E"/>
+                    </a:solidFill>
+                  </a:tcPr>
+                </a:tc>
+                <a:tc>
+                  <a:txBody>
+                    <a:bodyPr/>
+                    <a:lstStyle/>
+                    <a:p>
+                      <a:pPr algn="l"/>
+                      <a:r>
+                        <a:rPr lang="en-US" sz="1200" dirty="0" smtClean="0">
+                          <a:latin typeface="Times New Roman"/>
+                          <a:cs typeface="Times New Roman"/>
+                        </a:rPr>
+                        <a:t>Phenotypic measurements</a:t>
+                      </a:r>
+                      <a:endParaRPr lang="en-US" sz="1200" dirty="0">
+                        <a:latin typeface="Times New Roman"/>
+                        <a:cs typeface="Times New Roman"/>
+                      </a:endParaRPr>
+                    </a:p>
+                  </a:txBody>
+                  <a:tcPr anchor="b">
+                    <a:solidFill>
+                      <a:srgbClr val="045C0E"/>
+                    </a:solidFill>
+                  </a:tcPr>
+                </a:tc>
+                <a:tc gridSpan="2">
+                  <a:txBody>
+                    <a:bodyPr/>
+                    <a:lstStyle/>
+                    <a:p>
+                      <a:pPr algn="ctr"/>
+                      <a:r>
+                        <a:rPr lang="en-US" sz="1200" dirty="0" smtClean="0">
+                          <a:latin typeface="Times New Roman"/>
+                          <a:cs typeface="Times New Roman"/>
+                        </a:rPr>
+                        <a:t>Effect size</a:t>
+                      </a:r>
+                      <a:r>
+                        <a:rPr lang="en-US" sz="1200" baseline="0" dirty="0" smtClean="0">
+                          <a:latin typeface="Times New Roman"/>
+                          <a:cs typeface="Times New Roman"/>
+                        </a:rPr>
+                        <a:t> </a:t>
+                      </a:r>
+                    </a:p>
+                    <a:p>
+                      <a:pPr algn="ctr"/>
+                      <a:r>
+                        <a:rPr lang="en-US" sz="1200" baseline="0" dirty="0" smtClean="0">
+                          <a:latin typeface="Times New Roman"/>
+                          <a:cs typeface="Times New Roman"/>
+                        </a:rPr>
+                        <a:t>(p-values)</a:t>
+                      </a:r>
+                      <a:endParaRPr lang="en-US" sz="1200" dirty="0">
+                        <a:latin typeface="Times New Roman"/>
+                        <a:cs typeface="Times New Roman"/>
+                      </a:endParaRPr>
+                    </a:p>
+                  </a:txBody>
+                  <a:tcPr anchor="b">
+                    <a:solidFill>
+                      <a:srgbClr val="045C0E"/>
+                    </a:solidFill>
+                  </a:tcPr>
+                </a:tc>
+                <a:tc hMerge="1">
+                  <a:txBody>
+                    <a:bodyPr/>
+                    <a:lstStyle/>
+                    <a:p>
+                      <a:endParaRPr lang="en-US"/>
+                    </a:p>
+                  </a:txBody>
+                  <a:tcPr/>
+                </a:tc>
+              </a:tr>
+              <a:tr h="436688">
+                <a:tc>
+                  <a:txBody>
+                    <a:bodyPr/>
+                    <a:lstStyle/>
+                    <a:p>
+                      <a:r>
+                        <a:rPr lang="en-US" sz="1200" dirty="0" smtClean="0">
+                          <a:latin typeface="Times New Roman"/>
+                          <a:cs typeface="Times New Roman"/>
+                        </a:rPr>
+                        <a:t>3803_1</a:t>
+                      </a:r>
+                      <a:endParaRPr lang="en-US" sz="1200" dirty="0">
+                        <a:latin typeface="Times New Roman"/>
+                        <a:cs typeface="Times New Roman"/>
+                      </a:endParaRPr>
+                    </a:p>
+                  </a:txBody>
+                  <a:tcPr/>
+                </a:tc>
+                <a:tc>
+                  <a:txBody>
+                    <a:bodyPr/>
+                    <a:lstStyle/>
+                    <a:p>
+                      <a:r>
+                        <a:rPr lang="en-US" sz="1200" dirty="0" smtClean="0">
+                          <a:latin typeface="Times New Roman"/>
+                          <a:cs typeface="Times New Roman"/>
+                        </a:rPr>
+                        <a:t>White blood</a:t>
+                      </a:r>
+                      <a:r>
+                        <a:rPr lang="en-US" sz="1200" baseline="0" dirty="0" smtClean="0">
+                          <a:latin typeface="Times New Roman"/>
+                          <a:cs typeface="Times New Roman"/>
+                        </a:rPr>
+                        <a:t> cell count</a:t>
+                      </a:r>
+                    </a:p>
+                    <a:p>
+                      <a:r>
+                        <a:rPr lang="en-US" sz="1200" baseline="0" dirty="0" smtClean="0">
+                          <a:latin typeface="Times New Roman"/>
+                          <a:cs typeface="Times New Roman"/>
+                        </a:rPr>
+                        <a:t>Neutrophil cell count</a:t>
+                      </a:r>
+                    </a:p>
+                    <a:p>
+                      <a:r>
+                        <a:rPr lang="en-US" sz="1200" baseline="0" dirty="0" smtClean="0">
+                          <a:latin typeface="Times New Roman"/>
+                          <a:cs typeface="Times New Roman"/>
+                        </a:rPr>
+                        <a:t>Lymphocyte cell count</a:t>
+                      </a:r>
+                    </a:p>
+                    <a:p>
+                      <a:r>
+                        <a:rPr lang="en-US" sz="1200" baseline="0" dirty="0" smtClean="0">
+                          <a:latin typeface="Times New Roman"/>
+                          <a:cs typeface="Times New Roman"/>
+                        </a:rPr>
+                        <a:t>Eosinophil cell count</a:t>
+                      </a:r>
+                    </a:p>
+                    <a:p>
+                      <a:r>
+                        <a:rPr lang="en-US" sz="1200" baseline="0" dirty="0" smtClean="0">
+                          <a:latin typeface="Times New Roman"/>
+                          <a:cs typeface="Times New Roman"/>
+                        </a:rPr>
+                        <a:t>Basophil cell count</a:t>
+                      </a:r>
+                    </a:p>
+                    <a:p>
+                      <a:r>
+                        <a:rPr lang="en-US" sz="1200" baseline="0" dirty="0" smtClean="0">
+                          <a:latin typeface="Times New Roman"/>
+                          <a:cs typeface="Times New Roman"/>
+                        </a:rPr>
+                        <a:t>Monocyte cell count</a:t>
+                      </a:r>
+                    </a:p>
+                    <a:p>
+                      <a:r>
+                        <a:rPr lang="en-US" sz="1200" baseline="0" dirty="0" smtClean="0">
+                          <a:latin typeface="Times New Roman"/>
+                          <a:cs typeface="Times New Roman"/>
+                        </a:rPr>
+                        <a:t>Neutrophil differential </a:t>
+                      </a:r>
+                      <a:r>
+                        <a:rPr lang="en-US" sz="1200" kern="1200" baseline="0" dirty="0" smtClean="0">
+                          <a:solidFill>
+                            <a:schemeClr val="tx1"/>
+                          </a:solidFill>
+                          <a:latin typeface="Times New Roman"/>
+                          <a:ea typeface="+mn-ea"/>
+                          <a:cs typeface="Times New Roman"/>
+                        </a:rPr>
+                        <a:t>count</a:t>
+                      </a:r>
+                    </a:p>
+                    <a:p>
+                      <a:r>
+                        <a:rPr lang="en-US" sz="1200" baseline="0" dirty="0" smtClean="0">
+                          <a:latin typeface="Times New Roman"/>
+                          <a:cs typeface="Times New Roman"/>
+                        </a:rPr>
+                        <a:t>Lymphocyte differential count</a:t>
+                      </a:r>
+                    </a:p>
+                    <a:p>
+                      <a:r>
+                        <a:rPr lang="en-US" sz="1200" baseline="0" dirty="0" smtClean="0">
+                          <a:latin typeface="Times New Roman"/>
+                          <a:cs typeface="Times New Roman"/>
+                        </a:rPr>
+                        <a:t>Red blood cell count</a:t>
+                      </a:r>
+                    </a:p>
+                    <a:p>
+                      <a:r>
+                        <a:rPr lang="en-US" sz="1200" baseline="0" dirty="0" smtClean="0">
+                          <a:latin typeface="Times New Roman"/>
+                          <a:cs typeface="Times New Roman"/>
+                        </a:rPr>
+                        <a:t>Mean cell volume</a:t>
+                      </a:r>
+                    </a:p>
+                    <a:p>
+                      <a:r>
+                        <a:rPr lang="en-US" sz="1200" baseline="0" dirty="0" smtClean="0">
+                          <a:latin typeface="Times New Roman"/>
+                          <a:cs typeface="Times New Roman"/>
+                        </a:rPr>
+                        <a:t>Mean corpuscular hemoglobin</a:t>
+                      </a:r>
+                    </a:p>
+                    <a:p>
+                      <a:r>
+                        <a:rPr lang="en-US" sz="1200" dirty="0" smtClean="0">
+                          <a:latin typeface="Times New Roman"/>
+                          <a:cs typeface="Times New Roman"/>
+                        </a:rPr>
+                        <a:t>Platelet count</a:t>
+                      </a:r>
+                      <a:endParaRPr lang="en-US" sz="1200" dirty="0">
+                        <a:latin typeface="Times New Roman"/>
+                        <a:cs typeface="Times New Roman"/>
+                      </a:endParaRPr>
+                    </a:p>
+                  </a:txBody>
+                  <a:tcPr/>
+                </a:tc>
+                <a:tc>
+                  <a:txBody>
+                    <a:bodyPr/>
+                    <a:lstStyle/>
+                    <a:p>
+                      <a:pPr algn="r"/>
+                      <a:r>
+                        <a:rPr lang="en-US" sz="1200" dirty="0" smtClean="0">
+                          <a:latin typeface="Times New Roman"/>
+                          <a:cs typeface="Times New Roman"/>
+                        </a:rPr>
+                        <a:t>-2.99</a:t>
+                      </a:r>
+                      <a:r>
+                        <a:rPr lang="en-US" sz="1200" baseline="0" dirty="0" smtClean="0">
+                          <a:latin typeface="Times New Roman"/>
+                          <a:cs typeface="Times New Roman"/>
+                        </a:rPr>
+                        <a:t> </a:t>
+                      </a:r>
+                      <a:r>
+                        <a:rPr lang="en-US" sz="1200" kern="1200" dirty="0" smtClean="0">
+                          <a:solidFill>
+                            <a:schemeClr val="tx1"/>
+                          </a:solidFill>
+                          <a:latin typeface="Times New Roman"/>
+                          <a:ea typeface="+mn-ea"/>
+                          <a:cs typeface="Times New Roman"/>
+                        </a:rPr>
+                        <a:t>-0.19 -2.63 -0.11 -0.02 -0.03 0.39 -0.39 </a:t>
+                      </a:r>
+                      <a:r>
+                        <a:rPr lang="en-US" sz="1200" dirty="0" smtClean="0">
+                          <a:latin typeface="Times New Roman"/>
+                          <a:cs typeface="Times New Roman"/>
+                        </a:rPr>
+                        <a:t>-0.42 </a:t>
+                      </a:r>
+                      <a:r>
+                        <a:rPr lang="en-US" sz="1200" kern="1200" dirty="0" smtClean="0">
+                          <a:solidFill>
+                            <a:schemeClr val="tx1"/>
+                          </a:solidFill>
+                          <a:latin typeface="Times New Roman"/>
+                          <a:ea typeface="+mn-ea"/>
+                          <a:cs typeface="Times New Roman"/>
+                        </a:rPr>
+                        <a:t>2.48 0.55</a:t>
+                      </a:r>
+                    </a:p>
+                    <a:p>
+                      <a:pPr marL="0" marR="0" indent="0" algn="r" defTabSz="1254008" rtl="0" eaLnBrk="1" fontAlgn="auto" latinLnBrk="0" hangingPunct="1">
+                        <a:lnSpc>
+                          <a:spcPct val="100000"/>
+                        </a:lnSpc>
+                        <a:spcBef>
+                          <a:spcPts val="0"/>
+                        </a:spcBef>
+                        <a:spcAft>
+                          <a:spcPts val="0"/>
+                        </a:spcAft>
+                        <a:buClrTx/>
+                        <a:buSzTx/>
+                        <a:buFontTx/>
+                        <a:buNone/>
+                        <a:tabLst/>
+                        <a:defRPr/>
+                      </a:pPr>
+                      <a:r>
+                        <a:rPr lang="en-US" sz="1200" kern="1200" dirty="0" smtClean="0">
+                          <a:solidFill>
+                            <a:schemeClr val="tx1"/>
+                          </a:solidFill>
+                          <a:latin typeface="Times New Roman"/>
+                          <a:ea typeface="+mn-ea"/>
+                          <a:cs typeface="Times New Roman"/>
+                        </a:rPr>
+                        <a:t>-240</a:t>
+                      </a:r>
+                    </a:p>
+                  </a:txBody>
+                  <a:tcPr/>
+                </a:tc>
+                <a:tc>
+                  <a:txBody>
+                    <a:bodyPr/>
+                    <a:lstStyle/>
+                    <a:p>
+                      <a:pPr marL="0" marR="0" indent="0" algn="l" defTabSz="1254008" rtl="0" eaLnBrk="1" fontAlgn="auto" latinLnBrk="0" hangingPunct="1">
+                        <a:lnSpc>
+                          <a:spcPct val="100000"/>
+                        </a:lnSpc>
+                        <a:spcBef>
+                          <a:spcPts val="0"/>
+                        </a:spcBef>
+                        <a:spcAft>
+                          <a:spcPts val="0"/>
+                        </a:spcAft>
+                        <a:buClrTx/>
+                        <a:buSzTx/>
+                        <a:buFontTx/>
+                        <a:buNone/>
+                        <a:tabLst/>
+                        <a:defRPr/>
+                      </a:pPr>
+                      <a:r>
+                        <a:rPr lang="en-US" sz="1200" kern="1200" dirty="0" smtClean="0">
+                          <a:solidFill>
+                            <a:schemeClr val="tx1"/>
+                          </a:solidFill>
+                          <a:latin typeface="Times New Roman"/>
+                          <a:ea typeface="+mn-ea"/>
+                          <a:cs typeface="Times New Roman"/>
+                        </a:rPr>
+                        <a:t>(&lt; 0.0001)</a:t>
+                      </a:r>
+                    </a:p>
+                    <a:p>
+                      <a:pPr marL="0" marR="0" indent="0" algn="l" defTabSz="1254008" rtl="0" eaLnBrk="1" fontAlgn="auto" latinLnBrk="0" hangingPunct="1">
+                        <a:lnSpc>
+                          <a:spcPct val="100000"/>
+                        </a:lnSpc>
+                        <a:spcBef>
+                          <a:spcPts val="0"/>
+                        </a:spcBef>
+                        <a:spcAft>
+                          <a:spcPts val="0"/>
+                        </a:spcAft>
+                        <a:buClrTx/>
+                        <a:buSzTx/>
+                        <a:buFontTx/>
+                        <a:buNone/>
+                        <a:tabLst/>
+                        <a:defRPr/>
+                      </a:pPr>
+                      <a:r>
+                        <a:rPr lang="en-US" sz="1200" kern="1200" dirty="0" smtClean="0">
+                          <a:solidFill>
+                            <a:schemeClr val="tx1"/>
+                          </a:solidFill>
+                          <a:latin typeface="Times New Roman"/>
+                          <a:ea typeface="+mn-ea"/>
+                          <a:cs typeface="Times New Roman"/>
+                        </a:rPr>
+                        <a:t>(&lt; 0.0001)</a:t>
+                      </a:r>
+                    </a:p>
+                    <a:p>
+                      <a:pPr marL="0" marR="0" indent="0" algn="l" defTabSz="1254008" rtl="0" eaLnBrk="1" fontAlgn="auto" latinLnBrk="0" hangingPunct="1">
+                        <a:lnSpc>
+                          <a:spcPct val="100000"/>
+                        </a:lnSpc>
+                        <a:spcBef>
+                          <a:spcPts val="0"/>
+                        </a:spcBef>
+                        <a:spcAft>
+                          <a:spcPts val="0"/>
+                        </a:spcAft>
+                        <a:buClrTx/>
+                        <a:buSzTx/>
+                        <a:buFontTx/>
+                        <a:buNone/>
+                        <a:tabLst/>
+                        <a:defRPr/>
+                      </a:pPr>
+                      <a:r>
+                        <a:rPr lang="en-US" sz="1200" kern="1200" dirty="0" smtClean="0">
+                          <a:solidFill>
+                            <a:schemeClr val="tx1"/>
+                          </a:solidFill>
+                          <a:latin typeface="Times New Roman"/>
+                          <a:ea typeface="+mn-ea"/>
+                          <a:cs typeface="Times New Roman"/>
+                        </a:rPr>
+                        <a:t>(&lt; 0.0001)</a:t>
+                      </a:r>
+                    </a:p>
+                    <a:p>
+                      <a:pPr marL="0" marR="0" indent="0" algn="l" defTabSz="1254008" rtl="0" eaLnBrk="1" fontAlgn="auto" latinLnBrk="0" hangingPunct="1">
+                        <a:lnSpc>
+                          <a:spcPct val="100000"/>
+                        </a:lnSpc>
+                        <a:spcBef>
+                          <a:spcPts val="0"/>
+                        </a:spcBef>
+                        <a:spcAft>
+                          <a:spcPts val="0"/>
+                        </a:spcAft>
+                        <a:buClrTx/>
+                        <a:buSzTx/>
+                        <a:buFontTx/>
+                        <a:buNone/>
+                        <a:tabLst/>
+                        <a:defRPr/>
+                      </a:pPr>
+                      <a:r>
+                        <a:rPr lang="en-US" sz="1200" kern="1200" dirty="0" smtClean="0">
+                          <a:solidFill>
+                            <a:schemeClr val="tx1"/>
+                          </a:solidFill>
+                          <a:latin typeface="Times New Roman"/>
+                          <a:ea typeface="+mn-ea"/>
+                          <a:cs typeface="Times New Roman"/>
+                        </a:rPr>
+                        <a:t>(&lt; 0.0001)</a:t>
+                      </a:r>
+                    </a:p>
+                    <a:p>
+                      <a:pPr marL="0" marR="0" indent="0" algn="l" defTabSz="1254008" rtl="0" eaLnBrk="1" fontAlgn="auto" latinLnBrk="0" hangingPunct="1">
+                        <a:lnSpc>
+                          <a:spcPct val="100000"/>
+                        </a:lnSpc>
+                        <a:spcBef>
+                          <a:spcPts val="0"/>
+                        </a:spcBef>
+                        <a:spcAft>
+                          <a:spcPts val="0"/>
+                        </a:spcAft>
+                        <a:buClrTx/>
+                        <a:buSzTx/>
+                        <a:buFontTx/>
+                        <a:buNone/>
+                        <a:tabLst/>
+                        <a:defRPr/>
+                      </a:pPr>
+                      <a:r>
+                        <a:rPr lang="en-US" sz="1200" kern="1200" dirty="0" smtClean="0">
+                          <a:solidFill>
+                            <a:schemeClr val="tx1"/>
+                          </a:solidFill>
+                          <a:latin typeface="Times New Roman"/>
+                          <a:ea typeface="+mn-ea"/>
+                          <a:cs typeface="Times New Roman"/>
+                        </a:rPr>
+                        <a:t>(&lt; 0.0001)</a:t>
+                      </a:r>
+                    </a:p>
+                    <a:p>
+                      <a:pPr marL="0" marR="0" indent="0" algn="l" defTabSz="1254008" rtl="0" eaLnBrk="1" fontAlgn="auto" latinLnBrk="0" hangingPunct="1">
+                        <a:lnSpc>
+                          <a:spcPct val="100000"/>
+                        </a:lnSpc>
+                        <a:spcBef>
+                          <a:spcPts val="0"/>
+                        </a:spcBef>
+                        <a:spcAft>
+                          <a:spcPts val="0"/>
+                        </a:spcAft>
+                        <a:buClrTx/>
+                        <a:buSzTx/>
+                        <a:buFontTx/>
+                        <a:buNone/>
+                        <a:tabLst/>
+                        <a:defRPr/>
+                      </a:pPr>
+                      <a:r>
+                        <a:rPr lang="en-US" sz="1200" kern="1200" dirty="0" smtClean="0">
+                          <a:solidFill>
+                            <a:schemeClr val="tx1"/>
+                          </a:solidFill>
+                          <a:latin typeface="Times New Roman"/>
+                          <a:ea typeface="+mn-ea"/>
+                          <a:cs typeface="Times New Roman"/>
+                        </a:rPr>
+                        <a:t>(&lt; 0.0001)</a:t>
+                      </a:r>
+                    </a:p>
+                    <a:p>
+                      <a:pPr marL="0" marR="0" indent="0" algn="l" defTabSz="1254008" rtl="0" eaLnBrk="1" fontAlgn="auto" latinLnBrk="0" hangingPunct="1">
+                        <a:lnSpc>
+                          <a:spcPct val="100000"/>
+                        </a:lnSpc>
+                        <a:spcBef>
+                          <a:spcPts val="0"/>
+                        </a:spcBef>
+                        <a:spcAft>
+                          <a:spcPts val="0"/>
+                        </a:spcAft>
+                        <a:buClrTx/>
+                        <a:buSzTx/>
+                        <a:buFontTx/>
+                        <a:buNone/>
+                        <a:tabLst/>
+                        <a:defRPr/>
+                      </a:pPr>
+                      <a:r>
+                        <a:rPr lang="en-US" sz="1200" kern="1200" dirty="0" smtClean="0">
+                          <a:solidFill>
+                            <a:schemeClr val="tx1"/>
+                          </a:solidFill>
+                          <a:latin typeface="Times New Roman"/>
+                          <a:ea typeface="+mn-ea"/>
+                          <a:cs typeface="Times New Roman"/>
+                        </a:rPr>
+                        <a:t>(&lt; 0.0001)</a:t>
+                      </a:r>
+                    </a:p>
+                    <a:p>
+                      <a:pPr marL="0" marR="0" indent="0" algn="l" defTabSz="1254008" rtl="0" eaLnBrk="1" fontAlgn="auto" latinLnBrk="0" hangingPunct="1">
+                        <a:lnSpc>
+                          <a:spcPct val="100000"/>
+                        </a:lnSpc>
+                        <a:spcBef>
+                          <a:spcPts val="0"/>
+                        </a:spcBef>
+                        <a:spcAft>
+                          <a:spcPts val="0"/>
+                        </a:spcAft>
+                        <a:buClrTx/>
+                        <a:buSzTx/>
+                        <a:buFontTx/>
+                        <a:buNone/>
+                        <a:tabLst/>
+                        <a:defRPr/>
+                      </a:pPr>
+                      <a:r>
+                        <a:rPr lang="en-US" sz="1200" kern="1200" dirty="0" smtClean="0">
+                          <a:solidFill>
+                            <a:schemeClr val="tx1"/>
+                          </a:solidFill>
+                          <a:latin typeface="Times New Roman"/>
+                          <a:ea typeface="+mn-ea"/>
+                          <a:cs typeface="Times New Roman"/>
+                        </a:rPr>
+                        <a:t>(&lt; 0.0001)</a:t>
+                      </a:r>
+                    </a:p>
+                    <a:p>
+                      <a:pPr marL="0" marR="0" indent="0" algn="l" defTabSz="1254008" rtl="0" eaLnBrk="1" fontAlgn="auto" latinLnBrk="0" hangingPunct="1">
+                        <a:lnSpc>
+                          <a:spcPct val="100000"/>
+                        </a:lnSpc>
+                        <a:spcBef>
+                          <a:spcPts val="0"/>
+                        </a:spcBef>
+                        <a:spcAft>
+                          <a:spcPts val="0"/>
+                        </a:spcAft>
+                        <a:buClrTx/>
+                        <a:buSzTx/>
+                        <a:buFontTx/>
+                        <a:buNone/>
+                        <a:tabLst/>
+                        <a:defRPr/>
+                      </a:pPr>
+                      <a:r>
+                        <a:rPr lang="en-US" sz="1200" kern="1200" dirty="0" smtClean="0">
+                          <a:solidFill>
+                            <a:schemeClr val="tx1"/>
+                          </a:solidFill>
+                          <a:latin typeface="Times New Roman"/>
+                          <a:ea typeface="+mn-ea"/>
+                          <a:cs typeface="Times New Roman"/>
+                        </a:rPr>
+                        <a:t>(&lt; 0.0001)</a:t>
+                      </a:r>
+                    </a:p>
+                    <a:p>
+                      <a:pPr marL="0" marR="0" indent="0" algn="l" defTabSz="1254008" rtl="0" eaLnBrk="1" fontAlgn="auto" latinLnBrk="0" hangingPunct="1">
+                        <a:lnSpc>
+                          <a:spcPct val="100000"/>
+                        </a:lnSpc>
+                        <a:spcBef>
+                          <a:spcPts val="0"/>
+                        </a:spcBef>
+                        <a:spcAft>
+                          <a:spcPts val="0"/>
+                        </a:spcAft>
+                        <a:buClrTx/>
+                        <a:buSzTx/>
+                        <a:buFontTx/>
+                        <a:buNone/>
+                        <a:tabLst/>
+                        <a:defRPr/>
+                      </a:pPr>
+                      <a:r>
+                        <a:rPr lang="en-US" sz="1200" kern="1200" dirty="0" smtClean="0">
+                          <a:solidFill>
+                            <a:schemeClr val="tx1"/>
+                          </a:solidFill>
+                          <a:latin typeface="Times New Roman"/>
+                          <a:ea typeface="+mn-ea"/>
+                          <a:cs typeface="Times New Roman"/>
+                        </a:rPr>
+                        <a:t>(&lt; 0.0001)</a:t>
+                      </a:r>
+                    </a:p>
+                    <a:p>
+                      <a:pPr marL="0" marR="0" indent="0" algn="l" defTabSz="1254008" rtl="0" eaLnBrk="1" fontAlgn="auto" latinLnBrk="0" hangingPunct="1">
+                        <a:lnSpc>
+                          <a:spcPct val="100000"/>
+                        </a:lnSpc>
+                        <a:spcBef>
+                          <a:spcPts val="0"/>
+                        </a:spcBef>
+                        <a:spcAft>
+                          <a:spcPts val="0"/>
+                        </a:spcAft>
+                        <a:buClrTx/>
+                        <a:buSzTx/>
+                        <a:buFontTx/>
+                        <a:buNone/>
+                        <a:tabLst/>
+                        <a:defRPr/>
+                      </a:pPr>
+                      <a:r>
+                        <a:rPr lang="en-US" sz="1200" kern="1200" dirty="0" smtClean="0">
+                          <a:solidFill>
+                            <a:schemeClr val="tx1"/>
+                          </a:solidFill>
+                          <a:latin typeface="Times New Roman"/>
+                          <a:ea typeface="+mn-ea"/>
+                          <a:cs typeface="Times New Roman"/>
+                        </a:rPr>
+                        <a:t>(&lt; 0.0001)</a:t>
+                      </a:r>
+                    </a:p>
+                    <a:p>
+                      <a:pPr marL="0" marR="0" indent="0" algn="l" defTabSz="1254008" rtl="0" eaLnBrk="1" fontAlgn="auto" latinLnBrk="0" hangingPunct="1">
+                        <a:lnSpc>
+                          <a:spcPct val="100000"/>
+                        </a:lnSpc>
+                        <a:spcBef>
+                          <a:spcPts val="0"/>
+                        </a:spcBef>
+                        <a:spcAft>
+                          <a:spcPts val="0"/>
+                        </a:spcAft>
+                        <a:buClrTx/>
+                        <a:buSzTx/>
+                        <a:buFontTx/>
+                        <a:buNone/>
+                        <a:tabLst/>
+                        <a:defRPr/>
+                      </a:pPr>
+                      <a:r>
+                        <a:rPr lang="en-US" sz="1200" kern="1200" dirty="0" smtClean="0">
+                          <a:solidFill>
+                            <a:schemeClr val="tx1"/>
+                          </a:solidFill>
+                          <a:latin typeface="Times New Roman"/>
+                          <a:ea typeface="+mn-ea"/>
+                          <a:cs typeface="Times New Roman"/>
+                        </a:rPr>
+                        <a:t>(&lt; 0.0001)</a:t>
+                      </a:r>
+                    </a:p>
+                  </a:txBody>
+                  <a:tcPr marL="0"/>
+                </a:tc>
+              </a:tr>
+            </a:tbl>
+          </a:graphicData>
+        </a:graphic>
+      </p:graphicFrame>
     </p:spTree>
     <p:extLst>
       <p:ext uri="{BB962C8B-B14F-4D97-AF65-F5344CB8AC3E}">

</xml_diff>

<commit_message>
Changes to poster (new figures, changed configuration in results)
</commit_message>
<xml_diff>
--- a/Poster.pptx
+++ b/Poster.pptx
@@ -294,7 +294,7 @@
           <a:p>
             <a:fld id="{BA3D2166-DA3A-7E42-B5FA-B8909614B8FF}" type="datetimeFigureOut">
               <a:rPr lang="en-US" smtClean="0"/>
-              <a:t>2016-07-22</a:t>
+              <a:t>2016-07-23</a:t>
             </a:fld>
             <a:endParaRPr lang="en-US"/>
           </a:p>
@@ -464,7 +464,7 @@
           <a:p>
             <a:fld id="{BA3D2166-DA3A-7E42-B5FA-B8909614B8FF}" type="datetimeFigureOut">
               <a:rPr lang="en-US" smtClean="0"/>
-              <a:t>2016-07-22</a:t>
+              <a:t>2016-07-23</a:t>
             </a:fld>
             <a:endParaRPr lang="en-US"/>
           </a:p>
@@ -644,7 +644,7 @@
           <a:p>
             <a:fld id="{BA3D2166-DA3A-7E42-B5FA-B8909614B8FF}" type="datetimeFigureOut">
               <a:rPr lang="en-US" smtClean="0"/>
-              <a:t>2016-07-22</a:t>
+              <a:t>2016-07-23</a:t>
             </a:fld>
             <a:endParaRPr lang="en-US"/>
           </a:p>
@@ -814,7 +814,7 @@
           <a:p>
             <a:fld id="{BA3D2166-DA3A-7E42-B5FA-B8909614B8FF}" type="datetimeFigureOut">
               <a:rPr lang="en-US" smtClean="0"/>
-              <a:t>2016-07-22</a:t>
+              <a:t>2016-07-23</a:t>
             </a:fld>
             <a:endParaRPr lang="en-US"/>
           </a:p>
@@ -1060,7 +1060,7 @@
           <a:p>
             <a:fld id="{BA3D2166-DA3A-7E42-B5FA-B8909614B8FF}" type="datetimeFigureOut">
               <a:rPr lang="en-US" smtClean="0"/>
-              <a:t>2016-07-22</a:t>
+              <a:t>2016-07-23</a:t>
             </a:fld>
             <a:endParaRPr lang="en-US"/>
           </a:p>
@@ -1348,7 +1348,7 @@
           <a:p>
             <a:fld id="{BA3D2166-DA3A-7E42-B5FA-B8909614B8FF}" type="datetimeFigureOut">
               <a:rPr lang="en-US" smtClean="0"/>
-              <a:t>2016-07-22</a:t>
+              <a:t>2016-07-23</a:t>
             </a:fld>
             <a:endParaRPr lang="en-US"/>
           </a:p>
@@ -1775,7 +1775,7 @@
           <a:p>
             <a:fld id="{BA3D2166-DA3A-7E42-B5FA-B8909614B8FF}" type="datetimeFigureOut">
               <a:rPr lang="en-US" smtClean="0"/>
-              <a:t>2016-07-22</a:t>
+              <a:t>2016-07-23</a:t>
             </a:fld>
             <a:endParaRPr lang="en-US"/>
           </a:p>
@@ -1893,7 +1893,7 @@
           <a:p>
             <a:fld id="{BA3D2166-DA3A-7E42-B5FA-B8909614B8FF}" type="datetimeFigureOut">
               <a:rPr lang="en-US" smtClean="0"/>
-              <a:t>2016-07-22</a:t>
+              <a:t>2016-07-23</a:t>
             </a:fld>
             <a:endParaRPr lang="en-US"/>
           </a:p>
@@ -1988,7 +1988,7 @@
           <a:p>
             <a:fld id="{BA3D2166-DA3A-7E42-B5FA-B8909614B8FF}" type="datetimeFigureOut">
               <a:rPr lang="en-US" smtClean="0"/>
-              <a:t>2016-07-22</a:t>
+              <a:t>2016-07-23</a:t>
             </a:fld>
             <a:endParaRPr lang="en-US"/>
           </a:p>
@@ -2265,7 +2265,7 @@
           <a:p>
             <a:fld id="{BA3D2166-DA3A-7E42-B5FA-B8909614B8FF}" type="datetimeFigureOut">
               <a:rPr lang="en-US" smtClean="0"/>
-              <a:t>2016-07-22</a:t>
+              <a:t>2016-07-23</a:t>
             </a:fld>
             <a:endParaRPr lang="en-US"/>
           </a:p>
@@ -2518,7 +2518,7 @@
           <a:p>
             <a:fld id="{BA3D2166-DA3A-7E42-B5FA-B8909614B8FF}" type="datetimeFigureOut">
               <a:rPr lang="en-US" smtClean="0"/>
-              <a:t>2016-07-22</a:t>
+              <a:t>2016-07-23</a:t>
             </a:fld>
             <a:endParaRPr lang="en-US"/>
           </a:p>
@@ -2731,7 +2731,7 @@
           <a:p>
             <a:fld id="{BA3D2166-DA3A-7E42-B5FA-B8909614B8FF}" type="datetimeFigureOut">
               <a:rPr lang="en-US" smtClean="0"/>
-              <a:t>2016-07-22</a:t>
+              <a:t>2016-07-23</a:t>
             </a:fld>
             <a:endParaRPr lang="en-US"/>
           </a:p>
@@ -3126,8 +3126,8 @@
         </p:nvSpPr>
         <p:spPr bwMode="auto">
           <a:xfrm>
-            <a:off x="6182801" y="8890186"/>
-            <a:ext cx="15072665" cy="7424782"/>
+            <a:off x="6182801" y="8275045"/>
+            <a:ext cx="15072665" cy="8039923"/>
           </a:xfrm>
           <a:prstGeom prst="roundRect">
             <a:avLst>
@@ -3532,7 +3532,7 @@
         </p:nvSpPr>
         <p:spPr bwMode="auto">
           <a:xfrm>
-            <a:off x="6182801" y="3743883"/>
+            <a:off x="6174983" y="3382718"/>
             <a:ext cx="15072665" cy="4892327"/>
           </a:xfrm>
           <a:prstGeom prst="roundRect">
@@ -3823,7 +3823,7 @@
         </p:nvSpPr>
         <p:spPr>
           <a:xfrm>
-            <a:off x="6981031" y="3178026"/>
+            <a:off x="6915970" y="2921053"/>
             <a:ext cx="13481553" cy="461665"/>
           </a:xfrm>
           <a:prstGeom prst="rect">
@@ -4142,19 +4142,8 @@
                 <a:latin typeface="Times New Roman"/>
                 <a:cs typeface="Times New Roman"/>
               </a:rPr>
-              <a:t>To infer missing </a:t>
-            </a:r>
-            <a:r>
-              <a:rPr lang="en-US" sz="1600" dirty="0" smtClean="0">
-                <a:latin typeface="Times New Roman"/>
-                <a:cs typeface="Times New Roman"/>
-              </a:rPr>
-              <a:t>data from 5 phenotypic measurements: Red blood cell distribution width, Lymphocyte differential count, Basophil differential count, Neutrophil differential count, Monocyte	cell count.</a:t>
-            </a:r>
-            <a:endParaRPr lang="en-US" sz="1600" dirty="0" smtClean="0">
-              <a:latin typeface="Times New Roman"/>
-              <a:cs typeface="Times New Roman"/>
-            </a:endParaRPr>
+              <a:t>To infer missing data from 5 phenotypic measurements: Red blood cell distribution width, Lymphocyte differential count, Basophil differential count, Neutrophil differential count, Monocyte	cell count.</a:t>
+            </a:r>
           </a:p>
           <a:p>
             <a:pPr marL="342900" indent="-342900" algn="just">
@@ -4210,28 +4199,7 @@
                 <a:latin typeface="Times New Roman"/>
                 <a:cs typeface="Times New Roman"/>
               </a:rPr>
-              <a:t>Predictions for the 67 missing values </a:t>
-            </a:r>
-            <a:r>
-              <a:rPr lang="en-US" sz="1600" dirty="0" smtClean="0">
-                <a:latin typeface="Times New Roman"/>
-                <a:cs typeface="Times New Roman"/>
-              </a:rPr>
-              <a:t>were</a:t>
-            </a:r>
-            <a:r>
-              <a:rPr lang="en-US" sz="1600" dirty="0" smtClean="0">
-                <a:latin typeface="Times New Roman"/>
-                <a:cs typeface="Times New Roman"/>
-              </a:rPr>
-              <a:t> </a:t>
-            </a:r>
-            <a:r>
-              <a:rPr lang="en-US" sz="1600" dirty="0" smtClean="0">
-                <a:latin typeface="Times New Roman"/>
-                <a:cs typeface="Times New Roman"/>
-              </a:rPr>
-              <a:t>obtained with </a:t>
+              <a:t>Predictions for the 67 missing values were obtained with </a:t>
             </a:r>
             <a:r>
               <a:rPr lang="en-US" sz="1600" b="1" dirty="0" smtClean="0">
@@ -4265,28 +4233,7 @@
                 <a:latin typeface="Times New Roman"/>
                 <a:cs typeface="Times New Roman"/>
               </a:rPr>
-              <a:t>he unknown missing values </a:t>
-            </a:r>
-            <a:r>
-              <a:rPr lang="en-US" sz="1600" dirty="0" smtClean="0">
-                <a:latin typeface="Times New Roman"/>
-                <a:cs typeface="Times New Roman"/>
-              </a:rPr>
-              <a:t>wer</a:t>
-            </a:r>
-            <a:r>
-              <a:rPr lang="en-US" sz="1600" dirty="0" smtClean="0">
-                <a:latin typeface="Times New Roman"/>
-                <a:cs typeface="Times New Roman"/>
-              </a:rPr>
-              <a:t>e </a:t>
-            </a:r>
-            <a:r>
-              <a:rPr lang="en-US" sz="1600" dirty="0" smtClean="0">
-                <a:latin typeface="Times New Roman"/>
-                <a:cs typeface="Times New Roman"/>
-              </a:rPr>
-              <a:t>replaced by 30 independent simulated sets of values drawn from the posterior predictive distribution of the missing data conditional on the observed data.</a:t>
+              <a:t>he unknown missing values were replaced by 30 independent simulated sets of values drawn from the posterior predictive distribution of the missing data conditional on the observed data.</a:t>
             </a:r>
           </a:p>
           <a:p>
@@ -4299,21 +4246,7 @@
                 <a:latin typeface="Times New Roman"/>
                 <a:cs typeface="Times New Roman"/>
               </a:rPr>
-              <a:t>Predictions </a:t>
-            </a:r>
-            <a:r>
-              <a:rPr lang="en-US" sz="1600" dirty="0" smtClean="0">
-                <a:latin typeface="Times New Roman"/>
-                <a:cs typeface="Times New Roman"/>
-              </a:rPr>
-              <a:t>were </a:t>
-            </a:r>
-            <a:r>
-              <a:rPr lang="en-US" sz="1600" dirty="0" smtClean="0">
-                <a:latin typeface="Times New Roman"/>
-                <a:cs typeface="Times New Roman"/>
-              </a:rPr>
-              <a:t>obtained by averaging the imputed values across the 30 simulated dataset.</a:t>
+              <a:t>Predictions were obtained by averaging the imputed values across the 30 simulated dataset.</a:t>
             </a:r>
           </a:p>
           <a:p>
@@ -4326,14 +4259,7 @@
                 <a:latin typeface="Times New Roman"/>
                 <a:cs typeface="Times New Roman"/>
               </a:rPr>
-              <a:t>Assumes missing data are missing at random or completely at random</a:t>
-            </a:r>
-            <a:r>
-              <a:rPr lang="en-US" sz="1600" dirty="0" smtClean="0">
-                <a:latin typeface="Times New Roman"/>
-                <a:cs typeface="Times New Roman"/>
-              </a:rPr>
-              <a:t>.</a:t>
+              <a:t>Assumes missing data are missing at random or completely at random.</a:t>
             </a:r>
           </a:p>
           <a:p>
@@ -4542,7 +4468,7 @@
       </p:sp>
       <p:pic>
         <p:nvPicPr>
-          <p:cNvPr id="2" name="Picture 1" descr="sim_plot.pdf"/>
+          <p:cNvPr id="2" name="Picture 1"/>
           <p:cNvPicPr>
             <a:picLocks noChangeAspect="1"/>
           </p:cNvPicPr>
@@ -4562,8 +4488,8 @@
         </p:blipFill>
         <p:spPr>
           <a:xfrm>
-            <a:off x="7122140" y="3938008"/>
-            <a:ext cx="6082336" cy="3801460"/>
+            <a:off x="6534157" y="3938008"/>
+            <a:ext cx="6047310" cy="3801460"/>
           </a:xfrm>
           <a:prstGeom prst="rect">
             <a:avLst/>
@@ -4572,7 +4498,7 @@
       </p:pic>
       <p:pic>
         <p:nvPicPr>
-          <p:cNvPr id="17" name="Picture 16" descr="var29_plot.pdf"/>
+          <p:cNvPr id="17" name="Picture 16"/>
           <p:cNvPicPr>
             <a:picLocks noChangeAspect="1"/>
           </p:cNvPicPr>
@@ -4592,8 +4518,8 @@
         </p:blipFill>
         <p:spPr>
           <a:xfrm>
-            <a:off x="13928546" y="3923468"/>
-            <a:ext cx="6868800" cy="3816000"/>
+            <a:off x="12767732" y="3906758"/>
+            <a:ext cx="8029613" cy="3816000"/>
           </a:xfrm>
           <a:prstGeom prst="rect">
             <a:avLst/>
@@ -4647,14 +4573,14 @@
           <p:nvPr>
             <p:extLst>
               <p:ext uri="{D42A27DB-BD31-4B8C-83A1-F6EECF244321}">
-                <p14:modId xmlns:p14="http://schemas.microsoft.com/office/powerpoint/2010/main" val="2924908928"/>
+                <p14:modId xmlns:p14="http://schemas.microsoft.com/office/powerpoint/2010/main" val="3782507345"/>
               </p:ext>
             </p:extLst>
           </p:nvPr>
         </p:nvGraphicFramePr>
         <p:xfrm>
-          <a:off x="15517465" y="9293032"/>
-          <a:ext cx="4291124" cy="2796925"/>
+          <a:off x="13711599" y="8866631"/>
+          <a:ext cx="4291124" cy="2743200"/>
         </p:xfrm>
         <a:graphic>
           <a:graphicData uri="http://schemas.openxmlformats.org/drawingml/2006/table">
@@ -4668,7 +4594,7 @@
                 <a:gridCol w="536394"/>
                 <a:gridCol w="773038"/>
               </a:tblGrid>
-              <a:tr h="510925">
+              <a:tr h="0">
                 <a:tc>
                   <a:txBody>
                     <a:bodyPr/>
@@ -5383,13 +5309,13 @@
           <p:nvPr>
             <p:extLst>
               <p:ext uri="{D42A27DB-BD31-4B8C-83A1-F6EECF244321}">
-                <p14:modId xmlns:p14="http://schemas.microsoft.com/office/powerpoint/2010/main" val="2516754700"/>
+                <p14:modId xmlns:p14="http://schemas.microsoft.com/office/powerpoint/2010/main" val="481690807"/>
               </p:ext>
             </p:extLst>
           </p:nvPr>
         </p:nvGraphicFramePr>
         <p:xfrm>
-          <a:off x="6534157" y="9243624"/>
+          <a:off x="6463600" y="8866631"/>
           <a:ext cx="7177159" cy="4145280"/>
         </p:xfrm>
         <a:graphic>
@@ -5447,7 +5373,21 @@
                           <a:latin typeface="Times New Roman"/>
                           <a:cs typeface="Times New Roman"/>
                         </a:rPr>
-                        <a:t> measurements (direction of the association)</a:t>
+                        <a:t> measurements (direction of </a:t>
+                      </a:r>
+                      <a:r>
+                        <a:rPr lang="en-US" sz="1200" baseline="0" dirty="0" smtClean="0">
+                          <a:latin typeface="Times New Roman"/>
+                          <a:cs typeface="Times New Roman"/>
+                        </a:rPr>
+                        <a:t>association</a:t>
+                      </a:r>
+                      <a:r>
+                        <a:rPr lang="en-US" sz="1200" baseline="0" dirty="0" smtClean="0">
+                          <a:latin typeface="Times New Roman"/>
+                          <a:cs typeface="Times New Roman"/>
+                        </a:rPr>
+                        <a:t>)</a:t>
                       </a:r>
                       <a:endParaRPr lang="en-US" sz="1200" dirty="0">
                         <a:latin typeface="Times New Roman"/>
@@ -7500,7 +7440,7 @@
         </p:nvGrpSpPr>
         <p:grpSpPr>
           <a:xfrm>
-            <a:off x="14201370" y="12721343"/>
+            <a:off x="14226960" y="12151634"/>
             <a:ext cx="2885971" cy="1406854"/>
             <a:chOff x="14462697" y="12538892"/>
             <a:chExt cx="1992969" cy="1054681"/>
@@ -7758,7 +7698,7 @@
         </p:nvGrpSpPr>
         <p:grpSpPr>
           <a:xfrm>
-            <a:off x="14201367" y="13934461"/>
+            <a:off x="14224604" y="13321786"/>
             <a:ext cx="2870292" cy="980264"/>
             <a:chOff x="14462697" y="12538892"/>
             <a:chExt cx="2026967" cy="720000"/>
@@ -8014,7 +7954,7 @@
         </p:nvSpPr>
         <p:spPr>
           <a:xfrm>
-            <a:off x="13928546" y="12237080"/>
+            <a:off x="13915738" y="11750236"/>
             <a:ext cx="7072627" cy="369332"/>
           </a:xfrm>
           <a:prstGeom prst="rect">
@@ -8067,7 +8007,7 @@
         </p:nvGrpSpPr>
         <p:grpSpPr>
           <a:xfrm>
-            <a:off x="17175206" y="12721343"/>
+            <a:off x="17175206" y="12193088"/>
             <a:ext cx="3883116" cy="2597537"/>
             <a:chOff x="14279871" y="14292517"/>
             <a:chExt cx="3089955" cy="1965783"/>
@@ -8748,7 +8688,7 @@
         </p:nvGrpSpPr>
         <p:grpSpPr>
           <a:xfrm>
-            <a:off x="14201367" y="15111135"/>
+            <a:off x="14224604" y="14530582"/>
             <a:ext cx="4497332" cy="1409754"/>
             <a:chOff x="13988751" y="15397372"/>
             <a:chExt cx="4497332" cy="1409754"/>
@@ -9177,7 +9117,7 @@
         </p:nvSpPr>
         <p:spPr>
           <a:xfrm>
-            <a:off x="6463600" y="8949387"/>
+            <a:off x="6463600" y="8458320"/>
             <a:ext cx="7177159" cy="276999"/>
           </a:xfrm>
           <a:prstGeom prst="rect">
@@ -9220,7 +9160,7 @@
         </p:nvSpPr>
         <p:spPr>
           <a:xfrm>
-            <a:off x="14866683" y="9001569"/>
+            <a:off x="13711599" y="8458320"/>
             <a:ext cx="5530840" cy="276999"/>
           </a:xfrm>
           <a:prstGeom prst="rect">
@@ -9332,7 +9272,63 @@
                 <a:latin typeface="Times New Roman"/>
                 <a:cs typeface="Times New Roman"/>
               </a:rPr>
-              <a:t>Boxplots of Neutrophil differential count by knockout condition. The boxplots colored in green correspond to observed data. The boxplot colored in blue correspond to predicted data.</a:t>
+              <a:t>Boxplots of </a:t>
+            </a:r>
+            <a:r>
+              <a:rPr lang="en-US" sz="1200" dirty="0" smtClean="0">
+                <a:latin typeface="Times New Roman"/>
+                <a:cs typeface="Times New Roman"/>
+              </a:rPr>
+              <a:t>neutrophil </a:t>
+            </a:r>
+            <a:r>
+              <a:rPr lang="en-US" sz="1200" dirty="0" smtClean="0">
+                <a:latin typeface="Times New Roman"/>
+                <a:cs typeface="Times New Roman"/>
+              </a:rPr>
+              <a:t>differential count by knockout condition. The </a:t>
+            </a:r>
+            <a:r>
+              <a:rPr lang="en-US" sz="1200" dirty="0" smtClean="0">
+                <a:latin typeface="Times New Roman"/>
+                <a:cs typeface="Times New Roman"/>
+              </a:rPr>
+              <a:t>green boxplots correspond </a:t>
+            </a:r>
+            <a:r>
+              <a:rPr lang="en-US" sz="1200" dirty="0" smtClean="0">
+                <a:latin typeface="Times New Roman"/>
+                <a:cs typeface="Times New Roman"/>
+              </a:rPr>
+              <a:t>to observed </a:t>
+            </a:r>
+            <a:r>
+              <a:rPr lang="en-US" sz="1200" dirty="0" smtClean="0">
+                <a:latin typeface="Times New Roman"/>
+                <a:cs typeface="Times New Roman"/>
+              </a:rPr>
+              <a:t>data and </a:t>
+            </a:r>
+            <a:r>
+              <a:rPr lang="en-US" sz="1200" dirty="0">
+                <a:latin typeface="Times New Roman"/>
+                <a:cs typeface="Times New Roman"/>
+              </a:rPr>
+              <a:t>t</a:t>
+            </a:r>
+            <a:r>
+              <a:rPr lang="en-US" sz="1200" dirty="0" smtClean="0">
+                <a:latin typeface="Times New Roman"/>
+                <a:cs typeface="Times New Roman"/>
+              </a:rPr>
+              <a:t>he blue boxplots </a:t>
+            </a:r>
+            <a:r>
+              <a:rPr lang="en-US" sz="1200" dirty="0" smtClean="0">
+                <a:latin typeface="Times New Roman"/>
+                <a:cs typeface="Times New Roman"/>
+              </a:rPr>
+              <a:t>correspond to predicted data.</a:t>
             </a:r>
             <a:endParaRPr lang="en-US" sz="1200" dirty="0">
               <a:latin typeface="Times New Roman"/>
@@ -9573,7 +9569,7 @@
                 <a:latin typeface="Times New Roman"/>
                 <a:cs typeface="Times New Roman"/>
               </a:rPr>
-              <a:t>Acknowledgment</a:t>
+              <a:t>Acknowledgements</a:t>
             </a:r>
             <a:endParaRPr lang="en-US" sz="2400" b="1" dirty="0">
               <a:latin typeface="Times New Roman"/>
@@ -9591,7 +9587,7 @@
         <p:spPr>
           <a:xfrm>
             <a:off x="21473796" y="11934902"/>
-            <a:ext cx="5927228" cy="1846659"/>
+            <a:ext cx="5637215" cy="2092881"/>
           </a:xfrm>
           <a:prstGeom prst="rect">
             <a:avLst/>
@@ -9609,7 +9605,28 @@
                 <a:latin typeface="Times New Roman"/>
                 <a:cs typeface="Times New Roman"/>
               </a:rPr>
-              <a:t>Gabrielle would like to thank her PhD supervisors, Dr. Erica </a:t>
+              <a:t>GS </a:t>
+            </a:r>
+            <a:r>
+              <a:rPr lang="en-US" sz="1600" dirty="0" smtClean="0">
+                <a:latin typeface="Times New Roman"/>
+                <a:cs typeface="Times New Roman"/>
+              </a:rPr>
+              <a:t>would </a:t>
+            </a:r>
+            <a:r>
+              <a:rPr lang="en-US" sz="1600" dirty="0" smtClean="0">
+                <a:latin typeface="Times New Roman"/>
+                <a:cs typeface="Times New Roman"/>
+              </a:rPr>
+              <a:t>like </a:t>
+            </a:r>
+            <a:r>
+              <a:rPr lang="en-US" sz="1600" dirty="0" smtClean="0">
+                <a:latin typeface="Times New Roman"/>
+                <a:cs typeface="Times New Roman"/>
+              </a:rPr>
+              <a:t>to thank her PhD supervisors, Dr. Erica </a:t>
             </a:r>
             <a:r>
               <a:rPr lang="en-US" sz="1600" dirty="0" err="1" smtClean="0">
@@ -9623,7 +9640,133 @@
                 <a:latin typeface="Times New Roman"/>
                 <a:cs typeface="Times New Roman"/>
               </a:rPr>
-              <a:t> and Dr. Robert Platt, for giving her the opportunity to participate in this competition. Kevin BLABLA. We would like to thank Claudia LAST NAME for her precious insights on the biological prior knowledge of the studied phenotypes.</a:t>
+              <a:t> and Dr. Robert Platt, for giving her the opportunity to participate in this competition</a:t>
+            </a:r>
+            <a:r>
+              <a:rPr lang="en-US" sz="1600" dirty="0" smtClean="0">
+                <a:latin typeface="Times New Roman"/>
+                <a:cs typeface="Times New Roman"/>
+              </a:rPr>
+              <a:t>. KM would like to thank his PhD supervisors Celia </a:t>
+            </a:r>
+            <a:r>
+              <a:rPr lang="en-US" sz="1600" dirty="0" err="1" smtClean="0">
+                <a:latin typeface="Times New Roman"/>
+                <a:cs typeface="Times New Roman"/>
+              </a:rPr>
+              <a:t>Geenwood</a:t>
+            </a:r>
+            <a:r>
+              <a:rPr lang="en-US" sz="1600" dirty="0" smtClean="0">
+                <a:latin typeface="Times New Roman"/>
+                <a:cs typeface="Times New Roman"/>
+              </a:rPr>
+              <a:t> and </a:t>
+            </a:r>
+            <a:r>
+              <a:rPr lang="en-US" sz="1600" dirty="0" err="1" smtClean="0">
+                <a:latin typeface="Times New Roman"/>
+                <a:cs typeface="Times New Roman"/>
+              </a:rPr>
+              <a:t>Aurélie</a:t>
+            </a:r>
+            <a:r>
+              <a:rPr lang="en-US" sz="1600" dirty="0" smtClean="0">
+                <a:latin typeface="Times New Roman"/>
+                <a:cs typeface="Times New Roman"/>
+              </a:rPr>
+              <a:t> </a:t>
+            </a:r>
+            <a:r>
+              <a:rPr lang="en-US" sz="1600" dirty="0" err="1" smtClean="0">
+                <a:latin typeface="Times New Roman"/>
+                <a:cs typeface="Times New Roman"/>
+              </a:rPr>
+              <a:t>Labbe</a:t>
+            </a:r>
+            <a:r>
+              <a:rPr lang="en-US" sz="1600" dirty="0" smtClean="0">
+                <a:latin typeface="Times New Roman"/>
+                <a:cs typeface="Times New Roman"/>
+              </a:rPr>
+              <a:t>. </a:t>
+            </a:r>
+            <a:r>
+              <a:rPr lang="en-US" sz="1600" dirty="0" smtClean="0">
+                <a:latin typeface="Times New Roman"/>
+                <a:cs typeface="Times New Roman"/>
+              </a:rPr>
+              <a:t>We </a:t>
+            </a:r>
+            <a:r>
+              <a:rPr lang="en-US" sz="1600" dirty="0" smtClean="0">
+                <a:latin typeface="Times New Roman"/>
+                <a:cs typeface="Times New Roman"/>
+              </a:rPr>
+              <a:t>would also </a:t>
+            </a:r>
+            <a:r>
+              <a:rPr lang="en-US" sz="1600" dirty="0" smtClean="0">
+                <a:latin typeface="Times New Roman"/>
+                <a:cs typeface="Times New Roman"/>
+              </a:rPr>
+              <a:t>like to thank Claudia </a:t>
+            </a:r>
+            <a:r>
+              <a:rPr lang="en-US" sz="1600" dirty="0" err="1" smtClean="0">
+                <a:latin typeface="Times New Roman"/>
+                <a:cs typeface="Times New Roman"/>
+              </a:rPr>
+              <a:t>Kleinman</a:t>
+            </a:r>
+            <a:r>
+              <a:rPr lang="en-US" sz="1600" dirty="0" smtClean="0">
+                <a:latin typeface="Times New Roman"/>
+                <a:cs typeface="Times New Roman"/>
+              </a:rPr>
+              <a:t> for </a:t>
+            </a:r>
+            <a:r>
+              <a:rPr lang="en-US" sz="1600" dirty="0" smtClean="0">
+                <a:latin typeface="Times New Roman"/>
+                <a:cs typeface="Times New Roman"/>
+              </a:rPr>
+              <a:t>her precious insights on the </a:t>
+            </a:r>
+            <a:r>
+              <a:rPr lang="en-US" sz="1600" smtClean="0">
+                <a:latin typeface="Times New Roman"/>
+                <a:cs typeface="Times New Roman"/>
+              </a:rPr>
+              <a:t>biological </a:t>
+            </a:r>
+            <a:r>
+              <a:rPr lang="en-US" sz="1600" smtClean="0">
+                <a:latin typeface="Times New Roman"/>
+                <a:cs typeface="Times New Roman"/>
+              </a:rPr>
+              <a:t>interpretations</a:t>
+            </a:r>
+            <a:r>
+              <a:rPr lang="en-US" sz="1600">
+                <a:latin typeface="Times New Roman"/>
+                <a:cs typeface="Times New Roman"/>
+              </a:rPr>
+              <a:t> </a:t>
+            </a:r>
+            <a:r>
+              <a:rPr lang="en-US" sz="1600" smtClean="0">
+                <a:latin typeface="Times New Roman"/>
+                <a:cs typeface="Times New Roman"/>
+              </a:rPr>
+              <a:t>of </a:t>
+            </a:r>
+            <a:r>
+              <a:rPr lang="en-US" sz="1600" dirty="0" smtClean="0">
+                <a:latin typeface="Times New Roman"/>
+                <a:cs typeface="Times New Roman"/>
+              </a:rPr>
+              <a:t>the studied phenotypes.</a:t>
             </a:r>
           </a:p>
           <a:p>
@@ -9759,6 +9902,36 @@
           </a:p>
         </p:txBody>
       </p:sp>
+      <p:pic>
+        <p:nvPicPr>
+          <p:cNvPr id="29" name="Picture 28" descr="blood_diagram.png"/>
+          <p:cNvPicPr>
+            <a:picLocks noChangeAspect="1"/>
+          </p:cNvPicPr>
+          <p:nvPr/>
+        </p:nvPicPr>
+        <p:blipFill>
+          <a:blip r:embed="rId7">
+            <a:extLst>
+              <a:ext uri="{28A0092B-C50C-407E-A947-70E740481C1C}">
+                <a14:useLocalDpi xmlns:a14="http://schemas.microsoft.com/office/drawing/2010/main" val="0"/>
+              </a:ext>
+            </a:extLst>
+          </a:blip>
+          <a:stretch>
+            <a:fillRect/>
+          </a:stretch>
+        </p:blipFill>
+        <p:spPr>
+          <a:xfrm>
+            <a:off x="18171761" y="9325798"/>
+            <a:ext cx="2879183" cy="1793468"/>
+          </a:xfrm>
+          <a:prstGeom prst="rect">
+            <a:avLst/>
+          </a:prstGeom>
+        </p:spPr>
+      </p:pic>
     </p:spTree>
     <p:extLst>
       <p:ext uri="{BB962C8B-B14F-4D97-AF65-F5344CB8AC3E}">

</xml_diff>

<commit_message>
Poster: Ludmer logo, more text, formatting
</commit_message>
<xml_diff>
--- a/Poster.pptx
+++ b/Poster.pptx
@@ -3280,7 +3280,7 @@
         </p:blipFill>
         <p:spPr>
           <a:xfrm>
-            <a:off x="24820954" y="1344889"/>
+            <a:off x="22179354" y="148559"/>
             <a:ext cx="2272960" cy="1418381"/>
           </a:xfrm>
           <a:prstGeom prst="rect">
@@ -3350,8 +3350,8 @@
         </p:nvSpPr>
         <p:spPr>
           <a:xfrm>
-            <a:off x="258399" y="83239"/>
-            <a:ext cx="26852612" cy="830997"/>
+            <a:off x="-205942" y="274278"/>
+            <a:ext cx="26852612" cy="707886"/>
           </a:xfrm>
           <a:prstGeom prst="rect">
             <a:avLst/>
@@ -3366,16 +3366,16 @@
           <a:p>
             <a:pPr algn="ctr"/>
             <a:r>
-              <a:rPr lang="en-US" sz="4800" b="1" dirty="0" smtClean="0">
+              <a:rPr lang="en-US" sz="4000" b="1" dirty="0" smtClean="0">
                 <a:solidFill>
                   <a:srgbClr val="DA0000"/>
                 </a:solidFill>
                 <a:latin typeface="Times New Roman"/>
                 <a:cs typeface="Times New Roman"/>
               </a:rPr>
-              <a:t>TITLE – LUDMER logo??</a:t>
-            </a:r>
-            <a:endParaRPr lang="en-US" sz="4800" b="1" dirty="0">
+              <a:t>Causal Challenge 2016 - Mouse gene knockouts: prediction and causal inference</a:t>
+            </a:r>
+            <a:endParaRPr lang="en-US" sz="4000" b="1" dirty="0">
               <a:solidFill>
                 <a:srgbClr val="DA0000"/>
               </a:solidFill>
@@ -3997,7 +3997,7 @@
         </p:blipFill>
         <p:spPr>
           <a:xfrm>
-            <a:off x="24224593" y="171328"/>
+            <a:off x="24224593" y="319016"/>
             <a:ext cx="2869322" cy="1247924"/>
           </a:xfrm>
           <a:prstGeom prst="rect">
@@ -9143,7 +9143,14 @@
                 <a:latin typeface="Times New Roman"/>
                 <a:cs typeface="Times New Roman"/>
               </a:rPr>
-              <a:t>Knockout-phenotypes significant causal relationships</a:t>
+              <a:t>Knockout-phenotypes significant </a:t>
+            </a:r>
+            <a:r>
+              <a:rPr lang="en-US" sz="1200" dirty="0" smtClean="0">
+                <a:latin typeface="Times New Roman"/>
+                <a:cs typeface="Times New Roman"/>
+              </a:rPr>
+              <a:t>relationships</a:t>
             </a:r>
             <a:endParaRPr lang="en-US" sz="1200" dirty="0">
               <a:latin typeface="Times New Roman"/>
@@ -9160,8 +9167,8 @@
         </p:nvSpPr>
         <p:spPr>
           <a:xfrm>
-            <a:off x="13711599" y="8458320"/>
-            <a:ext cx="5530840" cy="276999"/>
+            <a:off x="13499513" y="8458320"/>
+            <a:ext cx="4934706" cy="276999"/>
           </a:xfrm>
           <a:prstGeom prst="rect">
             <a:avLst/>
@@ -9186,7 +9193,21 @@
                 <a:latin typeface="Times New Roman"/>
                 <a:cs typeface="Times New Roman"/>
               </a:rPr>
-              <a:t> Knockout-phenotypes significant causal relationships for knockout 3803_1</a:t>
+              <a:t> Knockout-phenotypes </a:t>
+            </a:r>
+            <a:r>
+              <a:rPr lang="en-US" sz="1200" dirty="0" smtClean="0">
+                <a:latin typeface="Times New Roman"/>
+                <a:cs typeface="Times New Roman"/>
+              </a:rPr>
+              <a:t>significant relationships </a:t>
+            </a:r>
+            <a:r>
+              <a:rPr lang="en-US" sz="1200" dirty="0" smtClean="0">
+                <a:latin typeface="Times New Roman"/>
+                <a:cs typeface="Times New Roman"/>
+              </a:rPr>
+              <a:t>for knockout 3803_1</a:t>
             </a:r>
             <a:endParaRPr lang="en-US" sz="1200" dirty="0">
               <a:latin typeface="Times New Roman"/>
@@ -9204,7 +9225,7 @@
         <p:spPr>
           <a:xfrm>
             <a:off x="6649419" y="7739468"/>
-            <a:ext cx="7177159" cy="276999"/>
+            <a:ext cx="6118313" cy="461665"/>
           </a:xfrm>
           <a:prstGeom prst="rect">
             <a:avLst/>
@@ -9229,7 +9250,23 @@
                 <a:latin typeface="Times New Roman"/>
                 <a:cs typeface="Times New Roman"/>
               </a:rPr>
-              <a:t>Simulation results </a:t>
+              <a:t>Results from simulation with 100 replications.  In each replication</a:t>
+            </a:r>
+            <a:r>
+              <a:rPr lang="en-US" sz="1200" dirty="0" smtClean="0">
+                <a:latin typeface="Times New Roman"/>
+                <a:cs typeface="Times New Roman"/>
+              </a:rPr>
+              <a:t> five variables were</a:t>
+            </a:r>
+          </a:p>
+          <a:p>
+            <a:r>
+              <a:rPr lang="en-US" sz="1200" dirty="0" smtClean="0">
+                <a:latin typeface="Times New Roman"/>
+                <a:cs typeface="Times New Roman"/>
+              </a:rPr>
+              <a:t>deleted for five different knockout conditions and the MSE of the imputed values was calculated.</a:t>
             </a:r>
             <a:endParaRPr lang="en-US" sz="1200" dirty="0">
               <a:latin typeface="Times New Roman"/>
@@ -9246,8 +9283,8 @@
         </p:nvSpPr>
         <p:spPr>
           <a:xfrm>
-            <a:off x="13960510" y="7722758"/>
-            <a:ext cx="7177159" cy="461665"/>
+            <a:off x="13220364" y="7744636"/>
+            <a:ext cx="7391736" cy="461665"/>
           </a:xfrm>
           <a:prstGeom prst="rect">
             <a:avLst/>
@@ -9549,7 +9586,7 @@
         </p:nvSpPr>
         <p:spPr>
           <a:xfrm>
-            <a:off x="21528016" y="11171431"/>
+            <a:off x="21513906" y="11473237"/>
             <a:ext cx="5693024" cy="461665"/>
           </a:xfrm>
           <a:prstGeom prst="rect">
@@ -9587,7 +9624,7 @@
         <p:spPr>
           <a:xfrm>
             <a:off x="21473796" y="11934902"/>
-            <a:ext cx="5637215" cy="2092881"/>
+            <a:ext cx="5637215" cy="1692771"/>
           </a:xfrm>
           <a:prstGeom prst="rect">
             <a:avLst/>
@@ -9601,168 +9638,161 @@
           <a:lstStyle/>
           <a:p>
             <a:r>
-              <a:rPr lang="en-US" sz="1600" dirty="0" smtClean="0">
+              <a:rPr lang="en-US" sz="1400" dirty="0" smtClean="0">
                 <a:latin typeface="Times New Roman"/>
                 <a:cs typeface="Times New Roman"/>
               </a:rPr>
               <a:t>GS </a:t>
             </a:r>
             <a:r>
-              <a:rPr lang="en-US" sz="1600" dirty="0" smtClean="0">
+              <a:rPr lang="en-US" sz="1400" dirty="0" smtClean="0">
                 <a:latin typeface="Times New Roman"/>
                 <a:cs typeface="Times New Roman"/>
               </a:rPr>
               <a:t>would </a:t>
             </a:r>
             <a:r>
-              <a:rPr lang="en-US" sz="1600" dirty="0" smtClean="0">
+              <a:rPr lang="en-US" sz="1400" dirty="0" smtClean="0">
                 <a:latin typeface="Times New Roman"/>
                 <a:cs typeface="Times New Roman"/>
               </a:rPr>
               <a:t>like </a:t>
             </a:r>
             <a:r>
-              <a:rPr lang="en-US" sz="1600" dirty="0" smtClean="0">
+              <a:rPr lang="en-US" sz="1400" dirty="0" smtClean="0">
                 <a:latin typeface="Times New Roman"/>
                 <a:cs typeface="Times New Roman"/>
               </a:rPr>
               <a:t>to thank her PhD supervisors, Dr. Erica </a:t>
             </a:r>
             <a:r>
-              <a:rPr lang="en-US" sz="1600" dirty="0" err="1" smtClean="0">
+              <a:rPr lang="en-US" sz="1400" dirty="0" err="1" smtClean="0">
                 <a:latin typeface="Times New Roman"/>
                 <a:cs typeface="Times New Roman"/>
               </a:rPr>
               <a:t>Moodie</a:t>
             </a:r>
             <a:r>
-              <a:rPr lang="en-US" sz="1600" dirty="0" smtClean="0">
+              <a:rPr lang="en-US" sz="1400" dirty="0" smtClean="0">
                 <a:latin typeface="Times New Roman"/>
                 <a:cs typeface="Times New Roman"/>
               </a:rPr>
               <a:t> and Dr. Robert Platt, for giving her the opportunity to participate in this competition</a:t>
             </a:r>
             <a:r>
-              <a:rPr lang="en-US" sz="1600" dirty="0" smtClean="0">
+              <a:rPr lang="en-US" sz="1400" dirty="0" smtClean="0">
                 <a:latin typeface="Times New Roman"/>
                 <a:cs typeface="Times New Roman"/>
               </a:rPr>
               <a:t>. KM would like to thank his PhD supervisors Celia </a:t>
             </a:r>
             <a:r>
-              <a:rPr lang="en-US" sz="1600" dirty="0" err="1" smtClean="0">
+              <a:rPr lang="en-US" sz="1400" dirty="0" err="1" smtClean="0">
                 <a:latin typeface="Times New Roman"/>
                 <a:cs typeface="Times New Roman"/>
               </a:rPr>
               <a:t>Geenwood</a:t>
             </a:r>
             <a:r>
-              <a:rPr lang="en-US" sz="1600" dirty="0" smtClean="0">
+              <a:rPr lang="en-US" sz="1400" dirty="0" smtClean="0">
                 <a:latin typeface="Times New Roman"/>
                 <a:cs typeface="Times New Roman"/>
               </a:rPr>
               <a:t> and </a:t>
             </a:r>
             <a:r>
-              <a:rPr lang="en-US" sz="1600" dirty="0" err="1" smtClean="0">
+              <a:rPr lang="en-US" sz="1400" dirty="0" err="1" smtClean="0">
                 <a:latin typeface="Times New Roman"/>
                 <a:cs typeface="Times New Roman"/>
               </a:rPr>
               <a:t>Aurélie</a:t>
             </a:r>
             <a:r>
-              <a:rPr lang="en-US" sz="1600" dirty="0" smtClean="0">
+              <a:rPr lang="en-US" sz="1400" dirty="0" smtClean="0">
                 <a:latin typeface="Times New Roman"/>
                 <a:cs typeface="Times New Roman"/>
               </a:rPr>
               <a:t> </a:t>
             </a:r>
             <a:r>
-              <a:rPr lang="en-US" sz="1600" dirty="0" err="1" smtClean="0">
+              <a:rPr lang="en-US" sz="1400" dirty="0" err="1" smtClean="0">
                 <a:latin typeface="Times New Roman"/>
                 <a:cs typeface="Times New Roman"/>
               </a:rPr>
               <a:t>Labbe</a:t>
             </a:r>
             <a:r>
-              <a:rPr lang="en-US" sz="1600" dirty="0" smtClean="0">
+              <a:rPr lang="en-US" sz="1400" dirty="0" smtClean="0">
                 <a:latin typeface="Times New Roman"/>
                 <a:cs typeface="Times New Roman"/>
               </a:rPr>
               <a:t>. </a:t>
             </a:r>
             <a:r>
-              <a:rPr lang="en-US" sz="1600" dirty="0" smtClean="0">
+              <a:rPr lang="en-US" sz="1400" dirty="0" smtClean="0">
                 <a:latin typeface="Times New Roman"/>
                 <a:cs typeface="Times New Roman"/>
               </a:rPr>
               <a:t>We </a:t>
             </a:r>
             <a:r>
-              <a:rPr lang="en-US" sz="1600" dirty="0" smtClean="0">
+              <a:rPr lang="en-US" sz="1400" dirty="0" smtClean="0">
                 <a:latin typeface="Times New Roman"/>
                 <a:cs typeface="Times New Roman"/>
               </a:rPr>
               <a:t>would also </a:t>
             </a:r>
             <a:r>
-              <a:rPr lang="en-US" sz="1600" dirty="0" smtClean="0">
+              <a:rPr lang="en-US" sz="1400" dirty="0" smtClean="0">
                 <a:latin typeface="Times New Roman"/>
                 <a:cs typeface="Times New Roman"/>
               </a:rPr>
               <a:t>like to thank Claudia </a:t>
             </a:r>
             <a:r>
-              <a:rPr lang="en-US" sz="1600" dirty="0" err="1" smtClean="0">
+              <a:rPr lang="en-US" sz="1400" dirty="0" err="1" smtClean="0">
                 <a:latin typeface="Times New Roman"/>
                 <a:cs typeface="Times New Roman"/>
               </a:rPr>
               <a:t>Kleinman</a:t>
             </a:r>
             <a:r>
-              <a:rPr lang="en-US" sz="1600" dirty="0" smtClean="0">
+              <a:rPr lang="en-US" sz="1400" dirty="0" smtClean="0">
                 <a:latin typeface="Times New Roman"/>
                 <a:cs typeface="Times New Roman"/>
               </a:rPr>
               <a:t> for </a:t>
             </a:r>
             <a:r>
-              <a:rPr lang="en-US" sz="1600" dirty="0" smtClean="0">
-                <a:latin typeface="Times New Roman"/>
-                <a:cs typeface="Times New Roman"/>
-              </a:rPr>
-              <a:t>her precious insights on the </a:t>
-            </a:r>
-            <a:r>
-              <a:rPr lang="en-US" sz="1600" smtClean="0">
-                <a:latin typeface="Times New Roman"/>
-                <a:cs typeface="Times New Roman"/>
-              </a:rPr>
-              <a:t>biological </a:t>
-            </a:r>
-            <a:r>
-              <a:rPr lang="en-US" sz="1600" smtClean="0">
+              <a:rPr lang="en-US" sz="1400" dirty="0" smtClean="0">
+                <a:latin typeface="Times New Roman"/>
+                <a:cs typeface="Times New Roman"/>
+              </a:rPr>
+              <a:t>her precious insights on the biological </a:t>
+            </a:r>
+            <a:r>
+              <a:rPr lang="en-US" sz="1400" dirty="0" smtClean="0">
                 <a:latin typeface="Times New Roman"/>
                 <a:cs typeface="Times New Roman"/>
               </a:rPr>
               <a:t>interpretations</a:t>
             </a:r>
             <a:r>
-              <a:rPr lang="en-US" sz="1600">
+              <a:rPr lang="en-US" sz="1400" dirty="0">
                 <a:latin typeface="Times New Roman"/>
                 <a:cs typeface="Times New Roman"/>
               </a:rPr>
               <a:t> </a:t>
             </a:r>
             <a:r>
-              <a:rPr lang="en-US" sz="1600" smtClean="0">
+              <a:rPr lang="en-US" sz="1400" dirty="0" smtClean="0">
                 <a:latin typeface="Times New Roman"/>
                 <a:cs typeface="Times New Roman"/>
               </a:rPr>
               <a:t>of </a:t>
             </a:r>
             <a:r>
-              <a:rPr lang="en-US" sz="1600" dirty="0" smtClean="0">
+              <a:rPr lang="en-US" sz="1400" dirty="0" smtClean="0">
                 <a:latin typeface="Times New Roman"/>
                 <a:cs typeface="Times New Roman"/>
               </a:rPr>
@@ -9924,7 +9954,7 @@
         </p:blipFill>
         <p:spPr>
           <a:xfrm>
-            <a:off x="18171761" y="9325798"/>
+            <a:off x="18171761" y="8905803"/>
             <a:ext cx="2879183" cy="1793468"/>
           </a:xfrm>
           <a:prstGeom prst="rect">
@@ -9932,6 +9962,289 @@
           </a:prstGeom>
         </p:spPr>
       </p:pic>
+      <p:sp>
+        <p:nvSpPr>
+          <p:cNvPr id="110" name="TextBox 109"/>
+          <p:cNvSpPr txBox="1"/>
+          <p:nvPr/>
+        </p:nvSpPr>
+        <p:spPr>
+          <a:xfrm>
+            <a:off x="18294456" y="10843567"/>
+            <a:ext cx="2843214" cy="461665"/>
+          </a:xfrm>
+          <a:prstGeom prst="rect">
+            <a:avLst/>
+          </a:prstGeom>
+          <a:noFill/>
+        </p:spPr>
+        <p:txBody>
+          <a:bodyPr wrap="square" rtlCol="0">
+            <a:spAutoFit/>
+          </a:bodyPr>
+          <a:lstStyle/>
+          <a:p>
+            <a:r>
+              <a:rPr lang="en-US" sz="1200" b="1" dirty="0" smtClean="0">
+                <a:latin typeface="Times New Roman"/>
+                <a:cs typeface="Times New Roman"/>
+              </a:rPr>
+              <a:t>Figure 3. </a:t>
+            </a:r>
+            <a:r>
+              <a:rPr lang="en-US" sz="1200" dirty="0">
+                <a:latin typeface="Times New Roman"/>
+                <a:cs typeface="Times New Roman"/>
+              </a:rPr>
+              <a:t> </a:t>
+            </a:r>
+            <a:r>
+              <a:rPr lang="en-US" sz="1200" dirty="0" smtClean="0">
+                <a:latin typeface="Times New Roman"/>
+                <a:cs typeface="Times New Roman"/>
+              </a:rPr>
+              <a:t>Range of components of mouse blood</a:t>
+            </a:r>
+            <a:r>
+              <a:rPr lang="en-US" sz="1200" dirty="0" smtClean="0">
+                <a:latin typeface="Times New Roman"/>
+                <a:cs typeface="Times New Roman"/>
+              </a:rPr>
+              <a:t> </a:t>
+            </a:r>
+            <a:endParaRPr lang="en-US" sz="1200" dirty="0">
+              <a:latin typeface="Times New Roman"/>
+              <a:cs typeface="Times New Roman"/>
+            </a:endParaRPr>
+          </a:p>
+        </p:txBody>
+      </p:sp>
+      <p:sp>
+        <p:nvSpPr>
+          <p:cNvPr id="35" name="TextBox 34"/>
+          <p:cNvSpPr txBox="1"/>
+          <p:nvPr/>
+        </p:nvSpPr>
+        <p:spPr>
+          <a:xfrm>
+            <a:off x="6463600" y="13321786"/>
+            <a:ext cx="7177159" cy="1569660"/>
+          </a:xfrm>
+          <a:prstGeom prst="rect">
+            <a:avLst/>
+          </a:prstGeom>
+          <a:noFill/>
+        </p:spPr>
+        <p:txBody>
+          <a:bodyPr wrap="square" rtlCol="0">
+            <a:spAutoFit/>
+          </a:bodyPr>
+          <a:lstStyle/>
+          <a:p>
+            <a:pPr marL="285750" indent="-285750">
+              <a:buFont typeface="Arial"/>
+              <a:buChar char="•"/>
+            </a:pPr>
+            <a:r>
+              <a:rPr lang="en-US" sz="1600" dirty="0" smtClean="0">
+                <a:latin typeface="Times New Roman"/>
+                <a:cs typeface="Times New Roman"/>
+              </a:rPr>
+              <a:t>Each phenotypic variable falls into one of three categories: </a:t>
+            </a:r>
+            <a:r>
+              <a:rPr lang="en-US" sz="1600" dirty="0" smtClean="0">
+                <a:solidFill>
+                  <a:srgbClr val="FF0000"/>
+                </a:solidFill>
+                <a:latin typeface="Times New Roman"/>
+                <a:cs typeface="Times New Roman"/>
+              </a:rPr>
+              <a:t>red blood cells</a:t>
+            </a:r>
+            <a:r>
+              <a:rPr lang="en-US" sz="1600" dirty="0" smtClean="0">
+                <a:latin typeface="Times New Roman"/>
+                <a:cs typeface="Times New Roman"/>
+              </a:rPr>
+              <a:t>,</a:t>
+            </a:r>
+            <a:r>
+              <a:rPr lang="en-US" sz="1600" dirty="0" smtClean="0">
+                <a:solidFill>
+                  <a:srgbClr val="FF0000"/>
+                </a:solidFill>
+                <a:latin typeface="Times New Roman"/>
+                <a:cs typeface="Times New Roman"/>
+              </a:rPr>
+              <a:t> </a:t>
+            </a:r>
+            <a:r>
+              <a:rPr lang="en-US" sz="1600" dirty="0" smtClean="0">
+                <a:solidFill>
+                  <a:schemeClr val="accent5"/>
+                </a:solidFill>
+                <a:latin typeface="Times New Roman"/>
+                <a:cs typeface="Times New Roman"/>
+              </a:rPr>
+              <a:t>white blood cells</a:t>
+            </a:r>
+            <a:r>
+              <a:rPr lang="en-US" sz="1600" dirty="0" smtClean="0">
+                <a:latin typeface="Times New Roman"/>
+                <a:cs typeface="Times New Roman"/>
+              </a:rPr>
+              <a:t>, and</a:t>
+            </a:r>
+            <a:r>
+              <a:rPr lang="en-US" sz="1600" dirty="0" smtClean="0">
+                <a:solidFill>
+                  <a:schemeClr val="accent5"/>
+                </a:solidFill>
+                <a:latin typeface="Times New Roman"/>
+                <a:cs typeface="Times New Roman"/>
+              </a:rPr>
+              <a:t> </a:t>
+            </a:r>
+            <a:r>
+              <a:rPr lang="en-US" sz="1600" dirty="0" smtClean="0">
+                <a:solidFill>
+                  <a:srgbClr val="045C0E"/>
+                </a:solidFill>
+                <a:latin typeface="Times New Roman"/>
+                <a:cs typeface="Times New Roman"/>
+              </a:rPr>
+              <a:t>platelets.</a:t>
+            </a:r>
+            <a:endParaRPr lang="en-US" sz="1600" dirty="0" smtClean="0">
+              <a:latin typeface="Times New Roman"/>
+              <a:cs typeface="Times New Roman"/>
+            </a:endParaRPr>
+          </a:p>
+          <a:p>
+            <a:pPr marL="285750" indent="-285750">
+              <a:buFont typeface="Arial"/>
+              <a:buChar char="•"/>
+            </a:pPr>
+            <a:r>
+              <a:rPr lang="en-US" sz="1600" dirty="0" smtClean="0">
+                <a:latin typeface="Times New Roman"/>
+                <a:cs typeface="Times New Roman"/>
+              </a:rPr>
+              <a:t>Many associations will appear due to construction of variables (i.e. lymphocyte cell count and lymphocyte differential count.)</a:t>
+            </a:r>
+          </a:p>
+          <a:p>
+            <a:pPr marL="285750" indent="-285750">
+              <a:buFont typeface="Arial"/>
+              <a:buChar char="•"/>
+            </a:pPr>
+            <a:r>
+              <a:rPr lang="en-US" sz="1600" dirty="0" smtClean="0">
+                <a:latin typeface="Times New Roman"/>
+                <a:cs typeface="Times New Roman"/>
+              </a:rPr>
+              <a:t>Causal direction, direct/indirect……</a:t>
+            </a:r>
+          </a:p>
+          <a:p>
+            <a:pPr marL="285750" indent="-285750">
+              <a:buFont typeface="Arial"/>
+              <a:buChar char="•"/>
+            </a:pPr>
+            <a:r>
+              <a:rPr lang="en-US" sz="1600" dirty="0" smtClean="0">
+                <a:latin typeface="Times New Roman"/>
+                <a:cs typeface="Times New Roman"/>
+              </a:rPr>
+              <a:t>Percentage in blood is important…..</a:t>
+            </a:r>
+          </a:p>
+        </p:txBody>
+      </p:sp>
+      <p:pic>
+        <p:nvPicPr>
+          <p:cNvPr id="36" name="Picture 35" descr="Logo-LUDMER.png"/>
+          <p:cNvPicPr>
+            <a:picLocks noChangeAspect="1"/>
+          </p:cNvPicPr>
+          <p:nvPr/>
+        </p:nvPicPr>
+        <p:blipFill>
+          <a:blip r:embed="rId8">
+            <a:extLst>
+              <a:ext uri="{28A0092B-C50C-407E-A947-70E740481C1C}">
+                <a14:useLocalDpi xmlns:a14="http://schemas.microsoft.com/office/drawing/2010/main" val="0"/>
+              </a:ext>
+            </a:extLst>
+          </a:blip>
+          <a:stretch>
+            <a:fillRect/>
+          </a:stretch>
+        </p:blipFill>
+        <p:spPr>
+          <a:xfrm>
+            <a:off x="22274724" y="1584328"/>
+            <a:ext cx="4355179" cy="1081873"/>
+          </a:xfrm>
+          <a:prstGeom prst="rect">
+            <a:avLst/>
+          </a:prstGeom>
+        </p:spPr>
+      </p:pic>
+      <p:sp>
+        <p:nvSpPr>
+          <p:cNvPr id="111" name="TextBox 110"/>
+          <p:cNvSpPr txBox="1"/>
+          <p:nvPr/>
+        </p:nvSpPr>
+        <p:spPr>
+          <a:xfrm>
+            <a:off x="217784" y="982164"/>
+            <a:ext cx="26852612" cy="584776"/>
+          </a:xfrm>
+          <a:prstGeom prst="rect">
+            <a:avLst/>
+          </a:prstGeom>
+          <a:noFill/>
+        </p:spPr>
+        <p:txBody>
+          <a:bodyPr wrap="square" rtlCol="0">
+            <a:spAutoFit/>
+          </a:bodyPr>
+          <a:lstStyle/>
+          <a:p>
+            <a:pPr algn="ctr"/>
+            <a:r>
+              <a:rPr lang="en-US" sz="3200" b="1" dirty="0" smtClean="0">
+                <a:solidFill>
+                  <a:srgbClr val="DA0000"/>
+                </a:solidFill>
+                <a:latin typeface="Times New Roman"/>
+                <a:cs typeface="Times New Roman"/>
+              </a:rPr>
+              <a:t>Team name: The </a:t>
+            </a:r>
+            <a:r>
+              <a:rPr lang="en-US" sz="3200" b="1" dirty="0" err="1" smtClean="0">
+                <a:solidFill>
+                  <a:srgbClr val="DA0000"/>
+                </a:solidFill>
+                <a:latin typeface="Times New Roman"/>
+                <a:cs typeface="Times New Roman"/>
+              </a:rPr>
+              <a:t>Noncompliers</a:t>
+            </a:r>
+            <a:endParaRPr lang="en-US" sz="3200" b="1" dirty="0">
+              <a:solidFill>
+                <a:srgbClr val="DA0000"/>
+              </a:solidFill>
+              <a:latin typeface="Times New Roman"/>
+              <a:cs typeface="Times New Roman"/>
+            </a:endParaRPr>
+          </a:p>
+        </p:txBody>
+      </p:sp>
     </p:spTree>
     <p:extLst>
       <p:ext uri="{BB962C8B-B14F-4D97-AF65-F5344CB8AC3E}">

</xml_diff>